<commit_message>
update genome annotation slides
</commit_message>
<xml_diff>
--- a/5.Annotation/GenomeAnnotation.pptx
+++ b/5.Annotation/GenomeAnnotation.pptx
@@ -5,7 +5,7 @@
     <p:sldMasterId id="2147483648" r:id="rId1"/>
   </p:sldMasterIdLst>
   <p:notesMasterIdLst>
-    <p:notesMasterId r:id="rId23"/>
+    <p:notesMasterId r:id="rId28"/>
   </p:notesMasterIdLst>
   <p:sldIdLst>
     <p:sldId id="256" r:id="rId2"/>
@@ -24,19 +24,24 @@
     <p:sldId id="275" r:id="rId15"/>
     <p:sldId id="265" r:id="rId16"/>
     <p:sldId id="266" r:id="rId17"/>
-    <p:sldId id="276" r:id="rId18"/>
-    <p:sldId id="267" r:id="rId19"/>
-    <p:sldId id="268" r:id="rId20"/>
-    <p:sldId id="269" r:id="rId21"/>
-    <p:sldId id="270" r:id="rId22"/>
+    <p:sldId id="277" r:id="rId18"/>
+    <p:sldId id="278" r:id="rId19"/>
+    <p:sldId id="280" r:id="rId20"/>
+    <p:sldId id="279" r:id="rId21"/>
+    <p:sldId id="276" r:id="rId22"/>
+    <p:sldId id="281" r:id="rId23"/>
+    <p:sldId id="267" r:id="rId24"/>
+    <p:sldId id="268" r:id="rId25"/>
+    <p:sldId id="269" r:id="rId26"/>
+    <p:sldId id="270" r:id="rId27"/>
   </p:sldIdLst>
   <p:sldSz cx="12192000" cy="6858000"/>
   <p:notesSz cx="6858000" cy="9144000"/>
   <p:embeddedFontLst>
     <p:embeddedFont>
       <p:font typeface="Play" pitchFamily="2" charset="0"/>
-      <p:regular r:id="rId24"/>
-      <p:bold r:id="rId25"/>
+      <p:regular r:id="rId29"/>
+      <p:bold r:id="rId30"/>
     </p:embeddedFont>
   </p:embeddedFontLst>
   <p:defaultTextStyle>
@@ -270,7 +275,7 @@
   </p:defaultTextStyle>
   <p:extLst>
     <p:ext uri="GoogleSlidesCustomDataVersion2">
-      <go:slidesCustomData xmlns:go="http://customooxmlschemas.google.com/" xmlns:ahyp="http://schemas.microsoft.com/office/drawing/2018/hyperlinkcolor" xmlns:p15="http://schemas.microsoft.com/office/powerpoint/2012/main" xmlns:p14="http://schemas.microsoft.com/office/powerpoint/2010/main" xmlns:com="http://schemas.openxmlformats.org/drawingml/2006/compatibility" xmlns:pvml="urn:schemas-microsoft-com:office:powerpoint" xmlns:v="urn:schemas-microsoft-com:vml" xmlns:o="urn:schemas-microsoft-com:office:office" xmlns:dgm="http://schemas.openxmlformats.org/drawingml/2006/diagram" xmlns:c="http://schemas.openxmlformats.org/drawingml/2006/chart" xmlns:mv="urn:schemas-microsoft-com:mac:vml" xmlns:mc="http://schemas.openxmlformats.org/markup-compatibility/2006" xmlns="" r:id="rId26" roundtripDataSignature="AMtx7mjC1RLoTFaQ/aepPzK2ny3UTUlf+w=="/>
+      <go:slidesCustomData xmlns:go="http://customooxmlschemas.google.com/" xmlns:ahyp="http://schemas.microsoft.com/office/drawing/2018/hyperlinkcolor" xmlns:p15="http://schemas.microsoft.com/office/powerpoint/2012/main" xmlns:p14="http://schemas.microsoft.com/office/powerpoint/2010/main" xmlns:com="http://schemas.openxmlformats.org/drawingml/2006/compatibility" xmlns:pvml="urn:schemas-microsoft-com:office:powerpoint" xmlns:v="urn:schemas-microsoft-com:vml" xmlns:o="urn:schemas-microsoft-com:office:office" xmlns:dgm="http://schemas.openxmlformats.org/drawingml/2006/diagram" xmlns:c="http://schemas.openxmlformats.org/drawingml/2006/chart" xmlns:mv="urn:schemas-microsoft-com:mac:vml" xmlns:mc="http://schemas.openxmlformats.org/markup-compatibility/2006" xmlns="" r:id="rId31" roundtripDataSignature="AMtx7mjC1RLoTFaQ/aepPzK2ny3UTUlf+w=="/>
     </p:ext>
   </p:extLst>
 </p:presentation>
@@ -1450,6 +1455,442 @@
     </p:spTree>
     <p:extLst>
       <p:ext uri="{BB962C8B-B14F-4D97-AF65-F5344CB8AC3E}">
+        <p14:creationId xmlns:p14="http://schemas.microsoft.com/office/powerpoint/2010/main" val="1457164335"/>
+      </p:ext>
+    </p:extLst>
+  </p:cSld>
+  <p:clrMapOvr>
+    <a:masterClrMapping/>
+  </p:clrMapOvr>
+</p:notes>
+</file>
+
+<file path=ppt/notesSlides/notesSlide16.xml><?xml version="1.0" encoding="utf-8"?>
+<p:notes xmlns:a="http://schemas.openxmlformats.org/drawingml/2006/main" xmlns:r="http://schemas.openxmlformats.org/officeDocument/2006/relationships" xmlns:p="http://schemas.openxmlformats.org/presentationml/2006/main" showMasterSp="0" showMasterPhAnim="0">
+  <p:cSld>
+    <p:spTree>
+      <p:nvGrpSpPr>
+        <p:cNvPr id="1" name="Shape 147"/>
+        <p:cNvGrpSpPr/>
+        <p:nvPr/>
+      </p:nvGrpSpPr>
+      <p:grpSpPr>
+        <a:xfrm>
+          <a:off x="0" y="0"/>
+          <a:ext cx="0" cy="0"/>
+          <a:chOff x="0" y="0"/>
+          <a:chExt cx="0" cy="0"/>
+        </a:xfrm>
+      </p:grpSpPr>
+      <p:sp>
+        <p:nvSpPr>
+          <p:cNvPr id="148" name="Google Shape;148;p12:notes"/>
+          <p:cNvSpPr txBox="1">
+            <a:spLocks noGrp="1"/>
+          </p:cNvSpPr>
+          <p:nvPr>
+            <p:ph type="body" idx="1"/>
+          </p:nvPr>
+        </p:nvSpPr>
+        <p:spPr>
+          <a:xfrm>
+            <a:off x="685800" y="4343400"/>
+            <a:ext cx="5486400" cy="4114800"/>
+          </a:xfrm>
+          <a:prstGeom prst="rect">
+            <a:avLst/>
+          </a:prstGeom>
+        </p:spPr>
+        <p:txBody>
+          <a:bodyPr spcFirstLastPara="1" wrap="square" lIns="91425" tIns="91425" rIns="91425" bIns="91425" anchor="t" anchorCtr="0">
+            <a:noAutofit/>
+          </a:bodyPr>
+          <a:lstStyle/>
+          <a:p>
+            <a:pPr marL="0" lvl="0" indent="0" algn="l" rtl="0">
+              <a:spcBef>
+                <a:spcPts val="0"/>
+              </a:spcBef>
+              <a:spcAft>
+                <a:spcPts val="0"/>
+              </a:spcAft>
+              <a:buNone/>
+            </a:pPr>
+            <a:endParaRPr/>
+          </a:p>
+        </p:txBody>
+      </p:sp>
+      <p:sp>
+        <p:nvSpPr>
+          <p:cNvPr id="149" name="Google Shape;149;p12:notes"/>
+          <p:cNvSpPr>
+            <a:spLocks noGrp="1" noRot="1" noChangeAspect="1"/>
+          </p:cNvSpPr>
+          <p:nvPr>
+            <p:ph type="sldImg" idx="2"/>
+          </p:nvPr>
+        </p:nvSpPr>
+        <p:spPr>
+          <a:xfrm>
+            <a:off x="381000" y="685800"/>
+            <a:ext cx="6096000" cy="3429000"/>
+          </a:xfrm>
+          <a:custGeom>
+            <a:avLst/>
+            <a:gdLst/>
+            <a:ahLst/>
+            <a:cxnLst/>
+            <a:rect l="l" t="t" r="r" b="b"/>
+            <a:pathLst>
+              <a:path w="120000" h="120000" extrusionOk="0">
+                <a:moveTo>
+                  <a:pt x="0" y="0"/>
+                </a:moveTo>
+                <a:lnTo>
+                  <a:pt x="120000" y="0"/>
+                </a:lnTo>
+                <a:lnTo>
+                  <a:pt x="120000" y="120000"/>
+                </a:lnTo>
+                <a:lnTo>
+                  <a:pt x="0" y="120000"/>
+                </a:lnTo>
+                <a:close/>
+              </a:path>
+            </a:pathLst>
+          </a:custGeom>
+        </p:spPr>
+      </p:sp>
+    </p:spTree>
+    <p:extLst>
+      <p:ext uri="{BB962C8B-B14F-4D97-AF65-F5344CB8AC3E}">
+        <p14:creationId xmlns:p14="http://schemas.microsoft.com/office/powerpoint/2010/main" val="2928002031"/>
+      </p:ext>
+    </p:extLst>
+  </p:cSld>
+  <p:clrMapOvr>
+    <a:masterClrMapping/>
+  </p:clrMapOvr>
+</p:notes>
+</file>
+
+<file path=ppt/notesSlides/notesSlide17.xml><?xml version="1.0" encoding="utf-8"?>
+<p:notes xmlns:a="http://schemas.openxmlformats.org/drawingml/2006/main" xmlns:r="http://schemas.openxmlformats.org/officeDocument/2006/relationships" xmlns:p="http://schemas.openxmlformats.org/presentationml/2006/main" showMasterSp="0" showMasterPhAnim="0">
+  <p:cSld>
+    <p:spTree>
+      <p:nvGrpSpPr>
+        <p:cNvPr id="1" name="Shape 147"/>
+        <p:cNvGrpSpPr/>
+        <p:nvPr/>
+      </p:nvGrpSpPr>
+      <p:grpSpPr>
+        <a:xfrm>
+          <a:off x="0" y="0"/>
+          <a:ext cx="0" cy="0"/>
+          <a:chOff x="0" y="0"/>
+          <a:chExt cx="0" cy="0"/>
+        </a:xfrm>
+      </p:grpSpPr>
+      <p:sp>
+        <p:nvSpPr>
+          <p:cNvPr id="148" name="Google Shape;148;p12:notes"/>
+          <p:cNvSpPr txBox="1">
+            <a:spLocks noGrp="1"/>
+          </p:cNvSpPr>
+          <p:nvPr>
+            <p:ph type="body" idx="1"/>
+          </p:nvPr>
+        </p:nvSpPr>
+        <p:spPr>
+          <a:xfrm>
+            <a:off x="685800" y="4343400"/>
+            <a:ext cx="5486400" cy="4114800"/>
+          </a:xfrm>
+          <a:prstGeom prst="rect">
+            <a:avLst/>
+          </a:prstGeom>
+        </p:spPr>
+        <p:txBody>
+          <a:bodyPr spcFirstLastPara="1" wrap="square" lIns="91425" tIns="91425" rIns="91425" bIns="91425" anchor="t" anchorCtr="0">
+            <a:noAutofit/>
+          </a:bodyPr>
+          <a:lstStyle/>
+          <a:p>
+            <a:pPr marL="0" lvl="0" indent="0" algn="l" rtl="0">
+              <a:spcBef>
+                <a:spcPts val="0"/>
+              </a:spcBef>
+              <a:spcAft>
+                <a:spcPts val="0"/>
+              </a:spcAft>
+              <a:buNone/>
+            </a:pPr>
+            <a:endParaRPr/>
+          </a:p>
+        </p:txBody>
+      </p:sp>
+      <p:sp>
+        <p:nvSpPr>
+          <p:cNvPr id="149" name="Google Shape;149;p12:notes"/>
+          <p:cNvSpPr>
+            <a:spLocks noGrp="1" noRot="1" noChangeAspect="1"/>
+          </p:cNvSpPr>
+          <p:nvPr>
+            <p:ph type="sldImg" idx="2"/>
+          </p:nvPr>
+        </p:nvSpPr>
+        <p:spPr>
+          <a:xfrm>
+            <a:off x="381000" y="685800"/>
+            <a:ext cx="6096000" cy="3429000"/>
+          </a:xfrm>
+          <a:custGeom>
+            <a:avLst/>
+            <a:gdLst/>
+            <a:ahLst/>
+            <a:cxnLst/>
+            <a:rect l="l" t="t" r="r" b="b"/>
+            <a:pathLst>
+              <a:path w="120000" h="120000" extrusionOk="0">
+                <a:moveTo>
+                  <a:pt x="0" y="0"/>
+                </a:moveTo>
+                <a:lnTo>
+                  <a:pt x="120000" y="0"/>
+                </a:lnTo>
+                <a:lnTo>
+                  <a:pt x="120000" y="120000"/>
+                </a:lnTo>
+                <a:lnTo>
+                  <a:pt x="0" y="120000"/>
+                </a:lnTo>
+                <a:close/>
+              </a:path>
+            </a:pathLst>
+          </a:custGeom>
+        </p:spPr>
+      </p:sp>
+    </p:spTree>
+    <p:extLst>
+      <p:ext uri="{BB962C8B-B14F-4D97-AF65-F5344CB8AC3E}">
+        <p14:creationId xmlns:p14="http://schemas.microsoft.com/office/powerpoint/2010/main" val="3695478609"/>
+      </p:ext>
+    </p:extLst>
+  </p:cSld>
+  <p:clrMapOvr>
+    <a:masterClrMapping/>
+  </p:clrMapOvr>
+</p:notes>
+</file>
+
+<file path=ppt/notesSlides/notesSlide18.xml><?xml version="1.0" encoding="utf-8"?>
+<p:notes xmlns:a="http://schemas.openxmlformats.org/drawingml/2006/main" xmlns:r="http://schemas.openxmlformats.org/officeDocument/2006/relationships" xmlns:p="http://schemas.openxmlformats.org/presentationml/2006/main" showMasterSp="0" showMasterPhAnim="0">
+  <p:cSld>
+    <p:spTree>
+      <p:nvGrpSpPr>
+        <p:cNvPr id="1" name="Shape 147"/>
+        <p:cNvGrpSpPr/>
+        <p:nvPr/>
+      </p:nvGrpSpPr>
+      <p:grpSpPr>
+        <a:xfrm>
+          <a:off x="0" y="0"/>
+          <a:ext cx="0" cy="0"/>
+          <a:chOff x="0" y="0"/>
+          <a:chExt cx="0" cy="0"/>
+        </a:xfrm>
+      </p:grpSpPr>
+      <p:sp>
+        <p:nvSpPr>
+          <p:cNvPr id="148" name="Google Shape;148;p12:notes"/>
+          <p:cNvSpPr txBox="1">
+            <a:spLocks noGrp="1"/>
+          </p:cNvSpPr>
+          <p:nvPr>
+            <p:ph type="body" idx="1"/>
+          </p:nvPr>
+        </p:nvSpPr>
+        <p:spPr>
+          <a:xfrm>
+            <a:off x="685800" y="4343400"/>
+            <a:ext cx="5486400" cy="4114800"/>
+          </a:xfrm>
+          <a:prstGeom prst="rect">
+            <a:avLst/>
+          </a:prstGeom>
+        </p:spPr>
+        <p:txBody>
+          <a:bodyPr spcFirstLastPara="1" wrap="square" lIns="91425" tIns="91425" rIns="91425" bIns="91425" anchor="t" anchorCtr="0">
+            <a:noAutofit/>
+          </a:bodyPr>
+          <a:lstStyle/>
+          <a:p>
+            <a:pPr marL="0" lvl="0" indent="0" algn="l" rtl="0">
+              <a:spcBef>
+                <a:spcPts val="0"/>
+              </a:spcBef>
+              <a:spcAft>
+                <a:spcPts val="0"/>
+              </a:spcAft>
+              <a:buNone/>
+            </a:pPr>
+            <a:endParaRPr/>
+          </a:p>
+        </p:txBody>
+      </p:sp>
+      <p:sp>
+        <p:nvSpPr>
+          <p:cNvPr id="149" name="Google Shape;149;p12:notes"/>
+          <p:cNvSpPr>
+            <a:spLocks noGrp="1" noRot="1" noChangeAspect="1"/>
+          </p:cNvSpPr>
+          <p:nvPr>
+            <p:ph type="sldImg" idx="2"/>
+          </p:nvPr>
+        </p:nvSpPr>
+        <p:spPr>
+          <a:xfrm>
+            <a:off x="381000" y="685800"/>
+            <a:ext cx="6096000" cy="3429000"/>
+          </a:xfrm>
+          <a:custGeom>
+            <a:avLst/>
+            <a:gdLst/>
+            <a:ahLst/>
+            <a:cxnLst/>
+            <a:rect l="l" t="t" r="r" b="b"/>
+            <a:pathLst>
+              <a:path w="120000" h="120000" extrusionOk="0">
+                <a:moveTo>
+                  <a:pt x="0" y="0"/>
+                </a:moveTo>
+                <a:lnTo>
+                  <a:pt x="120000" y="0"/>
+                </a:lnTo>
+                <a:lnTo>
+                  <a:pt x="120000" y="120000"/>
+                </a:lnTo>
+                <a:lnTo>
+                  <a:pt x="0" y="120000"/>
+                </a:lnTo>
+                <a:close/>
+              </a:path>
+            </a:pathLst>
+          </a:custGeom>
+        </p:spPr>
+      </p:sp>
+    </p:spTree>
+    <p:extLst>
+      <p:ext uri="{BB962C8B-B14F-4D97-AF65-F5344CB8AC3E}">
+        <p14:creationId xmlns:p14="http://schemas.microsoft.com/office/powerpoint/2010/main" val="985379050"/>
+      </p:ext>
+    </p:extLst>
+  </p:cSld>
+  <p:clrMapOvr>
+    <a:masterClrMapping/>
+  </p:clrMapOvr>
+</p:notes>
+</file>
+
+<file path=ppt/notesSlides/notesSlide19.xml><?xml version="1.0" encoding="utf-8"?>
+<p:notes xmlns:a="http://schemas.openxmlformats.org/drawingml/2006/main" xmlns:r="http://schemas.openxmlformats.org/officeDocument/2006/relationships" xmlns:p="http://schemas.openxmlformats.org/presentationml/2006/main" showMasterSp="0" showMasterPhAnim="0">
+  <p:cSld>
+    <p:spTree>
+      <p:nvGrpSpPr>
+        <p:cNvPr id="1" name="Shape 147"/>
+        <p:cNvGrpSpPr/>
+        <p:nvPr/>
+      </p:nvGrpSpPr>
+      <p:grpSpPr>
+        <a:xfrm>
+          <a:off x="0" y="0"/>
+          <a:ext cx="0" cy="0"/>
+          <a:chOff x="0" y="0"/>
+          <a:chExt cx="0" cy="0"/>
+        </a:xfrm>
+      </p:grpSpPr>
+      <p:sp>
+        <p:nvSpPr>
+          <p:cNvPr id="148" name="Google Shape;148;p12:notes"/>
+          <p:cNvSpPr txBox="1">
+            <a:spLocks noGrp="1"/>
+          </p:cNvSpPr>
+          <p:nvPr>
+            <p:ph type="body" idx="1"/>
+          </p:nvPr>
+        </p:nvSpPr>
+        <p:spPr>
+          <a:xfrm>
+            <a:off x="685800" y="4343400"/>
+            <a:ext cx="5486400" cy="4114800"/>
+          </a:xfrm>
+          <a:prstGeom prst="rect">
+            <a:avLst/>
+          </a:prstGeom>
+        </p:spPr>
+        <p:txBody>
+          <a:bodyPr spcFirstLastPara="1" wrap="square" lIns="91425" tIns="91425" rIns="91425" bIns="91425" anchor="t" anchorCtr="0">
+            <a:noAutofit/>
+          </a:bodyPr>
+          <a:lstStyle/>
+          <a:p>
+            <a:pPr marL="0" lvl="0" indent="0" algn="l" rtl="0">
+              <a:spcBef>
+                <a:spcPts val="0"/>
+              </a:spcBef>
+              <a:spcAft>
+                <a:spcPts val="0"/>
+              </a:spcAft>
+              <a:buNone/>
+            </a:pPr>
+            <a:endParaRPr/>
+          </a:p>
+        </p:txBody>
+      </p:sp>
+      <p:sp>
+        <p:nvSpPr>
+          <p:cNvPr id="149" name="Google Shape;149;p12:notes"/>
+          <p:cNvSpPr>
+            <a:spLocks noGrp="1" noRot="1" noChangeAspect="1"/>
+          </p:cNvSpPr>
+          <p:nvPr>
+            <p:ph type="sldImg" idx="2"/>
+          </p:nvPr>
+        </p:nvSpPr>
+        <p:spPr>
+          <a:xfrm>
+            <a:off x="381000" y="685800"/>
+            <a:ext cx="6096000" cy="3429000"/>
+          </a:xfrm>
+          <a:custGeom>
+            <a:avLst/>
+            <a:gdLst/>
+            <a:ahLst/>
+            <a:cxnLst/>
+            <a:rect l="l" t="t" r="r" b="b"/>
+            <a:pathLst>
+              <a:path w="120000" h="120000" extrusionOk="0">
+                <a:moveTo>
+                  <a:pt x="0" y="0"/>
+                </a:moveTo>
+                <a:lnTo>
+                  <a:pt x="120000" y="0"/>
+                </a:lnTo>
+                <a:lnTo>
+                  <a:pt x="120000" y="120000"/>
+                </a:lnTo>
+                <a:lnTo>
+                  <a:pt x="0" y="120000"/>
+                </a:lnTo>
+                <a:close/>
+              </a:path>
+            </a:pathLst>
+          </a:custGeom>
+        </p:spPr>
+      </p:sp>
+    </p:spTree>
+    <p:extLst>
+      <p:ext uri="{BB962C8B-B14F-4D97-AF65-F5344CB8AC3E}">
         <p14:creationId xmlns:p14="http://schemas.microsoft.com/office/powerpoint/2010/main" val="4215558844"/>
       </p:ext>
     </p:extLst>
@@ -1460,7 +1901,220 @@
 </p:notes>
 </file>
 
-<file path=ppt/notesSlides/notesSlide16.xml><?xml version="1.0" encoding="utf-8"?>
+<file path=ppt/notesSlides/notesSlide2.xml><?xml version="1.0" encoding="utf-8"?>
+<p:notes xmlns:a="http://schemas.openxmlformats.org/drawingml/2006/main" xmlns:r="http://schemas.openxmlformats.org/officeDocument/2006/relationships" xmlns:p="http://schemas.openxmlformats.org/presentationml/2006/main" showMasterSp="0" showMasterPhAnim="0">
+  <p:cSld>
+    <p:spTree>
+      <p:nvGrpSpPr>
+        <p:cNvPr id="1" name="Shape 89"/>
+        <p:cNvGrpSpPr/>
+        <p:nvPr/>
+      </p:nvGrpSpPr>
+      <p:grpSpPr>
+        <a:xfrm>
+          <a:off x="0" y="0"/>
+          <a:ext cx="0" cy="0"/>
+          <a:chOff x="0" y="0"/>
+          <a:chExt cx="0" cy="0"/>
+        </a:xfrm>
+      </p:grpSpPr>
+      <p:sp>
+        <p:nvSpPr>
+          <p:cNvPr id="90" name="Google Shape;90;p2:notes"/>
+          <p:cNvSpPr txBox="1">
+            <a:spLocks noGrp="1"/>
+          </p:cNvSpPr>
+          <p:nvPr>
+            <p:ph type="body" idx="1"/>
+          </p:nvPr>
+        </p:nvSpPr>
+        <p:spPr>
+          <a:xfrm>
+            <a:off x="685800" y="4343400"/>
+            <a:ext cx="5486400" cy="4114800"/>
+          </a:xfrm>
+          <a:prstGeom prst="rect">
+            <a:avLst/>
+          </a:prstGeom>
+        </p:spPr>
+        <p:txBody>
+          <a:bodyPr spcFirstLastPara="1" wrap="square" lIns="91425" tIns="91425" rIns="91425" bIns="91425" anchor="t" anchorCtr="0">
+            <a:noAutofit/>
+          </a:bodyPr>
+          <a:lstStyle/>
+          <a:p>
+            <a:pPr marL="0" lvl="0" indent="0" algn="l" rtl="0">
+              <a:spcBef>
+                <a:spcPts val="0"/>
+              </a:spcBef>
+              <a:spcAft>
+                <a:spcPts val="0"/>
+              </a:spcAft>
+              <a:buNone/>
+            </a:pPr>
+            <a:endParaRPr/>
+          </a:p>
+        </p:txBody>
+      </p:sp>
+      <p:sp>
+        <p:nvSpPr>
+          <p:cNvPr id="91" name="Google Shape;91;p2:notes"/>
+          <p:cNvSpPr>
+            <a:spLocks noGrp="1" noRot="1" noChangeAspect="1"/>
+          </p:cNvSpPr>
+          <p:nvPr>
+            <p:ph type="sldImg" idx="2"/>
+          </p:nvPr>
+        </p:nvSpPr>
+        <p:spPr>
+          <a:xfrm>
+            <a:off x="1143225" y="685800"/>
+            <a:ext cx="4572225" cy="3429000"/>
+          </a:xfrm>
+          <a:custGeom>
+            <a:avLst/>
+            <a:gdLst/>
+            <a:ahLst/>
+            <a:cxnLst/>
+            <a:rect l="l" t="t" r="r" b="b"/>
+            <a:pathLst>
+              <a:path w="120000" h="120000" extrusionOk="0">
+                <a:moveTo>
+                  <a:pt x="0" y="0"/>
+                </a:moveTo>
+                <a:lnTo>
+                  <a:pt x="120000" y="0"/>
+                </a:lnTo>
+                <a:lnTo>
+                  <a:pt x="120000" y="120000"/>
+                </a:lnTo>
+                <a:lnTo>
+                  <a:pt x="0" y="120000"/>
+                </a:lnTo>
+                <a:close/>
+              </a:path>
+            </a:pathLst>
+          </a:custGeom>
+        </p:spPr>
+      </p:sp>
+    </p:spTree>
+  </p:cSld>
+  <p:clrMapOvr>
+    <a:masterClrMapping/>
+  </p:clrMapOvr>
+</p:notes>
+</file>
+
+<file path=ppt/notesSlides/notesSlide20.xml><?xml version="1.0" encoding="utf-8"?>
+<p:notes xmlns:a="http://schemas.openxmlformats.org/drawingml/2006/main" xmlns:r="http://schemas.openxmlformats.org/officeDocument/2006/relationships" xmlns:p="http://schemas.openxmlformats.org/presentationml/2006/main" showMasterSp="0" showMasterPhAnim="0">
+  <p:cSld>
+    <p:spTree>
+      <p:nvGrpSpPr>
+        <p:cNvPr id="1" name="Shape 147"/>
+        <p:cNvGrpSpPr/>
+        <p:nvPr/>
+      </p:nvGrpSpPr>
+      <p:grpSpPr>
+        <a:xfrm>
+          <a:off x="0" y="0"/>
+          <a:ext cx="0" cy="0"/>
+          <a:chOff x="0" y="0"/>
+          <a:chExt cx="0" cy="0"/>
+        </a:xfrm>
+      </p:grpSpPr>
+      <p:sp>
+        <p:nvSpPr>
+          <p:cNvPr id="148" name="Google Shape;148;p12:notes"/>
+          <p:cNvSpPr txBox="1">
+            <a:spLocks noGrp="1"/>
+          </p:cNvSpPr>
+          <p:nvPr>
+            <p:ph type="body" idx="1"/>
+          </p:nvPr>
+        </p:nvSpPr>
+        <p:spPr>
+          <a:xfrm>
+            <a:off x="685800" y="4343400"/>
+            <a:ext cx="5486400" cy="4114800"/>
+          </a:xfrm>
+          <a:prstGeom prst="rect">
+            <a:avLst/>
+          </a:prstGeom>
+        </p:spPr>
+        <p:txBody>
+          <a:bodyPr spcFirstLastPara="1" wrap="square" lIns="91425" tIns="91425" rIns="91425" bIns="91425" anchor="t" anchorCtr="0">
+            <a:noAutofit/>
+          </a:bodyPr>
+          <a:lstStyle/>
+          <a:p>
+            <a:pPr marL="0" lvl="0" indent="0" algn="l" rtl="0">
+              <a:spcBef>
+                <a:spcPts val="0"/>
+              </a:spcBef>
+              <a:spcAft>
+                <a:spcPts val="0"/>
+              </a:spcAft>
+              <a:buNone/>
+            </a:pPr>
+            <a:endParaRPr/>
+          </a:p>
+        </p:txBody>
+      </p:sp>
+      <p:sp>
+        <p:nvSpPr>
+          <p:cNvPr id="149" name="Google Shape;149;p12:notes"/>
+          <p:cNvSpPr>
+            <a:spLocks noGrp="1" noRot="1" noChangeAspect="1"/>
+          </p:cNvSpPr>
+          <p:nvPr>
+            <p:ph type="sldImg" idx="2"/>
+          </p:nvPr>
+        </p:nvSpPr>
+        <p:spPr>
+          <a:xfrm>
+            <a:off x="381000" y="685800"/>
+            <a:ext cx="6096000" cy="3429000"/>
+          </a:xfrm>
+          <a:custGeom>
+            <a:avLst/>
+            <a:gdLst/>
+            <a:ahLst/>
+            <a:cxnLst/>
+            <a:rect l="l" t="t" r="r" b="b"/>
+            <a:pathLst>
+              <a:path w="120000" h="120000" extrusionOk="0">
+                <a:moveTo>
+                  <a:pt x="0" y="0"/>
+                </a:moveTo>
+                <a:lnTo>
+                  <a:pt x="120000" y="0"/>
+                </a:lnTo>
+                <a:lnTo>
+                  <a:pt x="120000" y="120000"/>
+                </a:lnTo>
+                <a:lnTo>
+                  <a:pt x="0" y="120000"/>
+                </a:lnTo>
+                <a:close/>
+              </a:path>
+            </a:pathLst>
+          </a:custGeom>
+        </p:spPr>
+      </p:sp>
+    </p:spTree>
+    <p:extLst>
+      <p:ext uri="{BB962C8B-B14F-4D97-AF65-F5344CB8AC3E}">
+        <p14:creationId xmlns:p14="http://schemas.microsoft.com/office/powerpoint/2010/main" val="3895471909"/>
+      </p:ext>
+    </p:extLst>
+  </p:cSld>
+  <p:clrMapOvr>
+    <a:masterClrMapping/>
+  </p:clrMapOvr>
+</p:notes>
+</file>
+
+<file path=ppt/notesSlides/notesSlide21.xml><?xml version="1.0" encoding="utf-8"?>
 <p:notes xmlns:a="http://schemas.openxmlformats.org/drawingml/2006/main" xmlns:r="http://schemas.openxmlformats.org/officeDocument/2006/relationships" xmlns:p="http://schemas.openxmlformats.org/presentationml/2006/main" showMasterSp="0" showMasterPhAnim="0">
   <p:cSld>
     <p:spTree>
@@ -1564,7 +2218,7 @@
 </p:notes>
 </file>
 
-<file path=ppt/notesSlides/notesSlide17.xml><?xml version="1.0" encoding="utf-8"?>
+<file path=ppt/notesSlides/notesSlide22.xml><?xml version="1.0" encoding="utf-8"?>
 <p:notes xmlns:a="http://schemas.openxmlformats.org/drawingml/2006/main" xmlns:r="http://schemas.openxmlformats.org/officeDocument/2006/relationships" xmlns:p="http://schemas.openxmlformats.org/presentationml/2006/main" showMasterSp="0" showMasterPhAnim="0">
   <p:cSld>
     <p:spTree>
@@ -1668,7 +2322,7 @@
 </p:notes>
 </file>
 
-<file path=ppt/notesSlides/notesSlide18.xml><?xml version="1.0" encoding="utf-8"?>
+<file path=ppt/notesSlides/notesSlide23.xml><?xml version="1.0" encoding="utf-8"?>
 <p:notes xmlns:a="http://schemas.openxmlformats.org/drawingml/2006/main" xmlns:r="http://schemas.openxmlformats.org/officeDocument/2006/relationships" xmlns:p="http://schemas.openxmlformats.org/presentationml/2006/main" showMasterSp="0" showMasterPhAnim="0">
   <p:cSld>
     <p:spTree>
@@ -1772,7 +2426,7 @@
 </p:notes>
 </file>
 
-<file path=ppt/notesSlides/notesSlide19.xml><?xml version="1.0" encoding="utf-8"?>
+<file path=ppt/notesSlides/notesSlide24.xml><?xml version="1.0" encoding="utf-8"?>
 <p:notes xmlns:a="http://schemas.openxmlformats.org/drawingml/2006/main" xmlns:r="http://schemas.openxmlformats.org/officeDocument/2006/relationships" xmlns:p="http://schemas.openxmlformats.org/presentationml/2006/main" showMasterSp="0" showMasterPhAnim="0">
   <p:cSld>
     <p:spTree>
@@ -1841,110 +2495,6 @@
           <a:xfrm>
             <a:off x="381000" y="685800"/>
             <a:ext cx="6096000" cy="3429000"/>
-          </a:xfrm>
-          <a:custGeom>
-            <a:avLst/>
-            <a:gdLst/>
-            <a:ahLst/>
-            <a:cxnLst/>
-            <a:rect l="l" t="t" r="r" b="b"/>
-            <a:pathLst>
-              <a:path w="120000" h="120000" extrusionOk="0">
-                <a:moveTo>
-                  <a:pt x="0" y="0"/>
-                </a:moveTo>
-                <a:lnTo>
-                  <a:pt x="120000" y="0"/>
-                </a:lnTo>
-                <a:lnTo>
-                  <a:pt x="120000" y="120000"/>
-                </a:lnTo>
-                <a:lnTo>
-                  <a:pt x="0" y="120000"/>
-                </a:lnTo>
-                <a:close/>
-              </a:path>
-            </a:pathLst>
-          </a:custGeom>
-        </p:spPr>
-      </p:sp>
-    </p:spTree>
-  </p:cSld>
-  <p:clrMapOvr>
-    <a:masterClrMapping/>
-  </p:clrMapOvr>
-</p:notes>
-</file>
-
-<file path=ppt/notesSlides/notesSlide2.xml><?xml version="1.0" encoding="utf-8"?>
-<p:notes xmlns:a="http://schemas.openxmlformats.org/drawingml/2006/main" xmlns:r="http://schemas.openxmlformats.org/officeDocument/2006/relationships" xmlns:p="http://schemas.openxmlformats.org/presentationml/2006/main" showMasterSp="0" showMasterPhAnim="0">
-  <p:cSld>
-    <p:spTree>
-      <p:nvGrpSpPr>
-        <p:cNvPr id="1" name="Shape 89"/>
-        <p:cNvGrpSpPr/>
-        <p:nvPr/>
-      </p:nvGrpSpPr>
-      <p:grpSpPr>
-        <a:xfrm>
-          <a:off x="0" y="0"/>
-          <a:ext cx="0" cy="0"/>
-          <a:chOff x="0" y="0"/>
-          <a:chExt cx="0" cy="0"/>
-        </a:xfrm>
-      </p:grpSpPr>
-      <p:sp>
-        <p:nvSpPr>
-          <p:cNvPr id="90" name="Google Shape;90;p2:notes"/>
-          <p:cNvSpPr txBox="1">
-            <a:spLocks noGrp="1"/>
-          </p:cNvSpPr>
-          <p:nvPr>
-            <p:ph type="body" idx="1"/>
-          </p:nvPr>
-        </p:nvSpPr>
-        <p:spPr>
-          <a:xfrm>
-            <a:off x="685800" y="4343400"/>
-            <a:ext cx="5486400" cy="4114800"/>
-          </a:xfrm>
-          <a:prstGeom prst="rect">
-            <a:avLst/>
-          </a:prstGeom>
-        </p:spPr>
-        <p:txBody>
-          <a:bodyPr spcFirstLastPara="1" wrap="square" lIns="91425" tIns="91425" rIns="91425" bIns="91425" anchor="t" anchorCtr="0">
-            <a:noAutofit/>
-          </a:bodyPr>
-          <a:lstStyle/>
-          <a:p>
-            <a:pPr marL="0" lvl="0" indent="0" algn="l" rtl="0">
-              <a:spcBef>
-                <a:spcPts val="0"/>
-              </a:spcBef>
-              <a:spcAft>
-                <a:spcPts val="0"/>
-              </a:spcAft>
-              <a:buNone/>
-            </a:pPr>
-            <a:endParaRPr/>
-          </a:p>
-        </p:txBody>
-      </p:sp>
-      <p:sp>
-        <p:nvSpPr>
-          <p:cNvPr id="91" name="Google Shape;91;p2:notes"/>
-          <p:cNvSpPr>
-            <a:spLocks noGrp="1" noRot="1" noChangeAspect="1"/>
-          </p:cNvSpPr>
-          <p:nvPr>
-            <p:ph type="sldImg" idx="2"/>
-          </p:nvPr>
-        </p:nvSpPr>
-        <p:spPr>
-          <a:xfrm>
-            <a:off x="1143225" y="685800"/>
-            <a:ext cx="4572225" cy="3429000"/>
           </a:xfrm>
           <a:custGeom>
             <a:avLst/>
@@ -15000,35 +15550,37 @@
               <a:rPr lang="en-US"/>
               <a:t>3 + 4. Structural and functional annotation</a:t>
             </a:r>
-            <a:endParaRPr/>
           </a:p>
         </p:txBody>
       </p:sp>
       <p:pic>
         <p:nvPicPr>
-          <p:cNvPr id="152" name="Google Shape;152;p12"/>
-          <p:cNvPicPr preferRelativeResize="0"/>
+          <p:cNvPr id="2" name="Picture 1">
+            <a:extLst>
+              <a:ext uri="{FF2B5EF4-FFF2-40B4-BE49-F238E27FC236}">
+                <a16:creationId xmlns:a16="http://schemas.microsoft.com/office/drawing/2014/main" id="{139650D1-0A0F-8837-1758-5A791E81F846}"/>
+              </a:ext>
+            </a:extLst>
+          </p:cNvPr>
+          <p:cNvPicPr>
+            <a:picLocks noChangeAspect="1"/>
+          </p:cNvPicPr>
           <p:nvPr/>
         </p:nvPicPr>
-        <p:blipFill rotWithShape="1">
-          <a:blip r:embed="rId3">
-            <a:alphaModFix/>
-          </a:blip>
-          <a:srcRect/>
-          <a:stretch/>
+        <p:blipFill>
+          <a:blip r:embed="rId3"/>
+          <a:stretch>
+            <a:fillRect/>
+          </a:stretch>
         </p:blipFill>
         <p:spPr>
           <a:xfrm>
-            <a:off x="1633182" y="1230085"/>
-            <a:ext cx="8719133" cy="5468145"/>
+            <a:off x="2497182" y="1343818"/>
+            <a:ext cx="7772400" cy="5023899"/>
           </a:xfrm>
           <a:prstGeom prst="rect">
             <a:avLst/>
           </a:prstGeom>
-          <a:noFill/>
-          <a:ln>
-            <a:noFill/>
-          </a:ln>
         </p:spPr>
       </p:pic>
     </p:spTree>
@@ -15103,10 +15655,270 @@
               <a:buNone/>
             </a:pPr>
             <a:r>
-              <a:rPr lang="en-US"/>
-              <a:t>3 + 4. Structural and functional annotation</a:t>
+              <a:rPr lang="en-US" dirty="0"/>
+              <a:t>3. Structural annotation</a:t>
             </a:r>
-            <a:endParaRPr/>
+            <a:endParaRPr dirty="0"/>
+          </a:p>
+        </p:txBody>
+      </p:sp>
+      <p:sp>
+        <p:nvSpPr>
+          <p:cNvPr id="2" name="Google Shape;146;p11">
+            <a:extLst>
+              <a:ext uri="{FF2B5EF4-FFF2-40B4-BE49-F238E27FC236}">
+                <a16:creationId xmlns:a16="http://schemas.microsoft.com/office/drawing/2014/main" id="{E78C3F95-DD55-2199-449A-4DDF3648AF25}"/>
+              </a:ext>
+            </a:extLst>
+          </p:cNvPr>
+          <p:cNvSpPr txBox="1">
+            <a:spLocks noGrp="1"/>
+          </p:cNvSpPr>
+          <p:nvPr>
+            <p:ph type="body" idx="1"/>
+          </p:nvPr>
+        </p:nvSpPr>
+        <p:spPr>
+          <a:xfrm>
+            <a:off x="838200" y="1825625"/>
+            <a:ext cx="10515600" cy="4351338"/>
+          </a:xfrm>
+          <a:prstGeom prst="rect">
+            <a:avLst/>
+          </a:prstGeom>
+          <a:noFill/>
+          <a:ln>
+            <a:noFill/>
+          </a:ln>
+        </p:spPr>
+        <p:txBody>
+          <a:bodyPr spcFirstLastPara="1" wrap="square" lIns="91425" tIns="45700" rIns="91425" bIns="45700" anchor="t" anchorCtr="0">
+            <a:normAutofit lnSpcReduction="10000"/>
+          </a:bodyPr>
+          <a:lstStyle/>
+          <a:p>
+            <a:pPr marL="228600" lvl="0" indent="-228600" algn="l" rtl="0">
+              <a:lnSpc>
+                <a:spcPct val="90000"/>
+              </a:lnSpc>
+              <a:spcBef>
+                <a:spcPts val="0"/>
+              </a:spcBef>
+              <a:spcAft>
+                <a:spcPts val="600"/>
+              </a:spcAft>
+              <a:buClr>
+                <a:schemeClr val="dk1"/>
+              </a:buClr>
+              <a:buSzPts val="2800"/>
+              <a:buChar char="•"/>
+            </a:pPr>
+            <a:r>
+              <a:rPr lang="en-US" dirty="0"/>
+              <a:t>structural annotation starts “</a:t>
+            </a:r>
+            <a:r>
+              <a:rPr lang="en-US" i="1" dirty="0"/>
+              <a:t>ab initio</a:t>
+            </a:r>
+            <a:r>
+              <a:rPr lang="en-US" dirty="0"/>
+              <a:t>” with training statistical models</a:t>
+            </a:r>
+          </a:p>
+          <a:p>
+            <a:pPr marL="228600" lvl="0" indent="-228600" algn="l" rtl="0">
+              <a:lnSpc>
+                <a:spcPct val="90000"/>
+              </a:lnSpc>
+              <a:spcBef>
+                <a:spcPts val="0"/>
+              </a:spcBef>
+              <a:spcAft>
+                <a:spcPts val="600"/>
+              </a:spcAft>
+              <a:buClr>
+                <a:schemeClr val="dk1"/>
+              </a:buClr>
+              <a:buSzPts val="2800"/>
+              <a:buChar char="•"/>
+            </a:pPr>
+            <a:r>
+              <a:rPr lang="en-US" dirty="0"/>
+              <a:t>“</a:t>
+            </a:r>
+            <a:r>
+              <a:rPr lang="en-US" i="1" dirty="0"/>
+              <a:t>ab initio </a:t>
+            </a:r>
+            <a:r>
+              <a:rPr lang="en-US" dirty="0"/>
+              <a:t>gene predictors use organism-specific genomic traits such as codon frequencies and distribution of intron-exon lengths, to distinguish genes from intergenic regions and to determine intron-exon structures” </a:t>
+            </a:r>
+            <a:r>
+              <a:rPr lang="en-US" dirty="0" err="1"/>
+              <a:t>Yandell</a:t>
+            </a:r>
+            <a:r>
+              <a:rPr lang="en-US" dirty="0"/>
+              <a:t> and </a:t>
+            </a:r>
+            <a:r>
+              <a:rPr lang="en-US" dirty="0" err="1"/>
+              <a:t>Ence</a:t>
+            </a:r>
+            <a:r>
+              <a:rPr lang="en-US" dirty="0"/>
+              <a:t> 2012</a:t>
+            </a:r>
+            <a:endParaRPr dirty="0"/>
+          </a:p>
+          <a:p>
+            <a:pPr marL="228600" lvl="0" indent="-228600" algn="l" rtl="0">
+              <a:lnSpc>
+                <a:spcPct val="90000"/>
+              </a:lnSpc>
+              <a:spcBef>
+                <a:spcPts val="1000"/>
+              </a:spcBef>
+              <a:spcAft>
+                <a:spcPts val="0"/>
+              </a:spcAft>
+              <a:buClr>
+                <a:schemeClr val="dk1"/>
+              </a:buClr>
+              <a:buSzPts val="2800"/>
+              <a:buChar char="•"/>
+            </a:pPr>
+            <a:r>
+              <a:rPr lang="en-US" dirty="0"/>
+              <a:t>Tools:</a:t>
+            </a:r>
+          </a:p>
+          <a:p>
+            <a:pPr marL="685800" lvl="1" indent="-228600">
+              <a:spcBef>
+                <a:spcPts val="1000"/>
+              </a:spcBef>
+              <a:buSzPts val="2800"/>
+            </a:pPr>
+            <a:r>
+              <a:rPr lang="en-US" dirty="0"/>
+              <a:t>Snap - easy to train</a:t>
+            </a:r>
+          </a:p>
+          <a:p>
+            <a:pPr marL="685800" lvl="1" indent="-228600">
+              <a:spcBef>
+                <a:spcPts val="1000"/>
+              </a:spcBef>
+              <a:buSzPts val="2800"/>
+            </a:pPr>
+            <a:r>
+              <a:rPr lang="en-US" dirty="0" err="1"/>
+              <a:t>Gmap</a:t>
+            </a:r>
+            <a:r>
+              <a:rPr lang="en-US" dirty="0"/>
+              <a:t> - difficult to train</a:t>
+            </a:r>
+          </a:p>
+          <a:p>
+            <a:pPr marL="685800" lvl="1" indent="-228600">
+              <a:spcBef>
+                <a:spcPts val="1000"/>
+              </a:spcBef>
+              <a:buSzPts val="2800"/>
+            </a:pPr>
+            <a:r>
+              <a:rPr lang="en-US" dirty="0" err="1"/>
+              <a:t>Genemark</a:t>
+            </a:r>
+            <a:endParaRPr lang="en-US" dirty="0"/>
+          </a:p>
+        </p:txBody>
+      </p:sp>
+    </p:spTree>
+    <p:extLst>
+      <p:ext uri="{BB962C8B-B14F-4D97-AF65-F5344CB8AC3E}">
+        <p14:creationId xmlns:p14="http://schemas.microsoft.com/office/powerpoint/2010/main" val="3632072863"/>
+      </p:ext>
+    </p:extLst>
+  </p:cSld>
+  <p:clrMapOvr>
+    <a:masterClrMapping/>
+  </p:clrMapOvr>
+</p:sld>
+</file>
+
+<file path=ppt/slides/slide18.xml><?xml version="1.0" encoding="utf-8"?>
+<p:sld xmlns:a="http://schemas.openxmlformats.org/drawingml/2006/main" xmlns:r="http://schemas.openxmlformats.org/officeDocument/2006/relationships" xmlns:p="http://schemas.openxmlformats.org/presentationml/2006/main">
+  <p:cSld>
+    <p:spTree>
+      <p:nvGrpSpPr>
+        <p:cNvPr id="1" name="Shape 150"/>
+        <p:cNvGrpSpPr/>
+        <p:nvPr/>
+      </p:nvGrpSpPr>
+      <p:grpSpPr>
+        <a:xfrm>
+          <a:off x="0" y="0"/>
+          <a:ext cx="0" cy="0"/>
+          <a:chOff x="0" y="0"/>
+          <a:chExt cx="0" cy="0"/>
+        </a:xfrm>
+      </p:grpSpPr>
+      <p:sp>
+        <p:nvSpPr>
+          <p:cNvPr id="151" name="Google Shape;151;p12"/>
+          <p:cNvSpPr txBox="1">
+            <a:spLocks noGrp="1"/>
+          </p:cNvSpPr>
+          <p:nvPr>
+            <p:ph type="title"/>
+          </p:nvPr>
+        </p:nvSpPr>
+        <p:spPr>
+          <a:xfrm>
+            <a:off x="838200" y="18255"/>
+            <a:ext cx="10515600" cy="1325563"/>
+          </a:xfrm>
+          <a:prstGeom prst="rect">
+            <a:avLst/>
+          </a:prstGeom>
+          <a:noFill/>
+          <a:ln>
+            <a:noFill/>
+          </a:ln>
+        </p:spPr>
+        <p:txBody>
+          <a:bodyPr spcFirstLastPara="1" wrap="square" lIns="91425" tIns="45700" rIns="91425" bIns="45700" anchor="ctr" anchorCtr="0">
+            <a:normAutofit/>
+          </a:bodyPr>
+          <a:lstStyle/>
+          <a:p>
+            <a:pPr marL="0" lvl="0" indent="0" algn="l" rtl="0">
+              <a:lnSpc>
+                <a:spcPct val="90000"/>
+              </a:lnSpc>
+              <a:spcBef>
+                <a:spcPts val="0"/>
+              </a:spcBef>
+              <a:spcAft>
+                <a:spcPts val="0"/>
+              </a:spcAft>
+              <a:buClr>
+                <a:schemeClr val="dk1"/>
+              </a:buClr>
+              <a:buSzPts val="4400"/>
+              <a:buFont typeface="Play"/>
+              <a:buNone/>
+            </a:pPr>
+            <a:r>
+              <a:rPr lang="en-US" dirty="0"/>
+              <a:t>3. Structural annotation</a:t>
+            </a:r>
+            <a:endParaRPr dirty="0"/>
           </a:p>
         </p:txBody>
       </p:sp>
@@ -15163,17 +15975,8 @@
             </a:pPr>
             <a:r>
               <a:rPr lang="en-US" dirty="0"/>
-              <a:t>EASEL is written as a </a:t>
+              <a:t>structural annotation also includes aligning gene evidence such as RNA and protein sequences to the genome</a:t>
             </a:r>
-            <a:r>
-              <a:rPr lang="en-US" dirty="0" err="1"/>
-              <a:t>nextflow</a:t>
-            </a:r>
-            <a:r>
-              <a:rPr lang="en-US" dirty="0"/>
-              <a:t> pipeline to run the entire annotation process instead of working step-by-step</a:t>
-            </a:r>
-            <a:endParaRPr dirty="0"/>
           </a:p>
           <a:p>
             <a:pPr marL="228600" lvl="0" indent="-228600" algn="l" rtl="0">
@@ -15181,10 +15984,10 @@
                 <a:spcPct val="90000"/>
               </a:lnSpc>
               <a:spcBef>
-                <a:spcPts val="1000"/>
-              </a:spcBef>
-              <a:spcAft>
-                <a:spcPts val="0"/>
+                <a:spcPts val="0"/>
+              </a:spcBef>
+              <a:spcAft>
+                <a:spcPts val="600"/>
               </a:spcAft>
               <a:buClr>
                 <a:schemeClr val="dk1"/>
@@ -15194,8 +15997,25 @@
             </a:pPr>
             <a:r>
               <a:rPr lang="en-US" dirty="0"/>
-              <a:t>includes pre-processing of RNA data, alignment to the genome, as well as structural and functional annotations</a:t>
+              <a:t>output is generally </a:t>
             </a:r>
+            <a:r>
+              <a:rPr lang="en-US" dirty="0" err="1"/>
+              <a:t>gff</a:t>
+            </a:r>
+            <a:r>
+              <a:rPr lang="en-US" dirty="0"/>
+              <a:t>, bam, or </a:t>
+            </a:r>
+            <a:r>
+              <a:rPr lang="en-US" dirty="0" err="1"/>
+              <a:t>vcf</a:t>
+            </a:r>
+            <a:r>
+              <a:rPr lang="en-US" dirty="0"/>
+              <a:t> files</a:t>
+            </a:r>
+            <a:endParaRPr dirty="0"/>
           </a:p>
           <a:p>
             <a:pPr marL="228600" lvl="0" indent="-228600" algn="l" rtl="0">
@@ -15216,93 +16036,55 @@
             </a:pPr>
             <a:r>
               <a:rPr lang="en-US" dirty="0"/>
-              <a:t>requires the install of </a:t>
+              <a:t>Tools:</a:t>
             </a:r>
+          </a:p>
+          <a:p>
+            <a:pPr marL="685800" lvl="1" indent="-228600">
+              <a:spcBef>
+                <a:spcPts val="1000"/>
+              </a:spcBef>
+              <a:buSzPts val="2800"/>
+            </a:pPr>
+            <a:r>
+              <a:rPr lang="en-US" dirty="0"/>
+              <a:t>Hisat2 - align RNA-seq</a:t>
+            </a:r>
+          </a:p>
+          <a:p>
+            <a:pPr marL="685800" lvl="1" indent="-228600">
+              <a:spcBef>
+                <a:spcPts val="1000"/>
+              </a:spcBef>
+              <a:buSzPts val="2800"/>
+            </a:pPr>
             <a:r>
               <a:rPr lang="en-US" dirty="0" err="1"/>
-              <a:t>Nextflow</a:t>
+              <a:t>Gmap</a:t>
             </a:r>
             <a:r>
               <a:rPr lang="en-US" dirty="0"/>
-              <a:t> and Docker/Singularity as well as GNU utilities</a:t>
+              <a:t> - align mRNA</a:t>
             </a:r>
           </a:p>
           <a:p>
-            <a:pPr marL="228600" lvl="0" indent="-228600" algn="l" rtl="0">
-              <a:lnSpc>
-                <a:spcPct val="90000"/>
-              </a:lnSpc>
+            <a:pPr marL="685800" lvl="1" indent="-228600">
               <a:spcBef>
                 <a:spcPts val="1000"/>
               </a:spcBef>
-              <a:spcAft>
-                <a:spcPts val="0"/>
-              </a:spcAft>
-              <a:buClr>
-                <a:schemeClr val="dk1"/>
-              </a:buClr>
               <a:buSzPts val="2800"/>
-              <a:buChar char="•"/>
             </a:pPr>
             <a:r>
               <a:rPr lang="en-US" dirty="0"/>
-              <a:t>uses AUGUSTUS to predict gene models</a:t>
+              <a:t>StringTie2 - transcriptome assembly</a:t>
             </a:r>
-          </a:p>
-          <a:p>
-            <a:pPr marL="228600" lvl="0" indent="-228600" algn="l" rtl="0">
-              <a:lnSpc>
-                <a:spcPct val="90000"/>
-              </a:lnSpc>
-              <a:spcBef>
-                <a:spcPts val="1000"/>
-              </a:spcBef>
-              <a:spcAft>
-                <a:spcPts val="0"/>
-              </a:spcAft>
-              <a:buClr>
-                <a:schemeClr val="dk1"/>
-              </a:buClr>
-              <a:buSzPts val="2800"/>
-              <a:buChar char="•"/>
-            </a:pPr>
-            <a:r>
-              <a:rPr lang="en-US" dirty="0">
-                <a:hlinkClick r:id="rId3"/>
-              </a:rPr>
-              <a:t>https://gitlab.com/PlantGenomicsLab/easel#what-is-easel</a:t>
-            </a:r>
-            <a:r>
-              <a:rPr lang="en-US" dirty="0"/>
-              <a:t> </a:t>
-            </a:r>
-            <a:endParaRPr dirty="0"/>
-          </a:p>
-          <a:p>
-            <a:pPr marL="228600" lvl="0" indent="-50800" algn="l" rtl="0">
-              <a:lnSpc>
-                <a:spcPct val="90000"/>
-              </a:lnSpc>
-              <a:spcBef>
-                <a:spcPts val="1000"/>
-              </a:spcBef>
-              <a:spcAft>
-                <a:spcPts val="0"/>
-              </a:spcAft>
-              <a:buClr>
-                <a:schemeClr val="dk1"/>
-              </a:buClr>
-              <a:buSzPts val="2800"/>
-              <a:buNone/>
-            </a:pPr>
-            <a:endParaRPr dirty="0"/>
           </a:p>
         </p:txBody>
       </p:sp>
     </p:spTree>
     <p:extLst>
       <p:ext uri="{BB962C8B-B14F-4D97-AF65-F5344CB8AC3E}">
-        <p14:creationId xmlns:p14="http://schemas.microsoft.com/office/powerpoint/2010/main" val="1557196692"/>
+        <p14:creationId xmlns:p14="http://schemas.microsoft.com/office/powerpoint/2010/main" val="4032086097"/>
       </p:ext>
     </p:extLst>
   </p:cSld>
@@ -15312,12 +16094,12 @@
 </p:sld>
 </file>
 
-<file path=ppt/slides/slide18.xml><?xml version="1.0" encoding="utf-8"?>
+<file path=ppt/slides/slide19.xml><?xml version="1.0" encoding="utf-8"?>
 <p:sld xmlns:a="http://schemas.openxmlformats.org/drawingml/2006/main" xmlns:r="http://schemas.openxmlformats.org/officeDocument/2006/relationships" xmlns:p="http://schemas.openxmlformats.org/presentationml/2006/main">
   <p:cSld>
     <p:spTree>
       <p:nvGrpSpPr>
-        <p:cNvPr id="1" name="Shape 156"/>
+        <p:cNvPr id="1" name="Shape 150"/>
         <p:cNvGrpSpPr/>
         <p:nvPr/>
       </p:nvGrpSpPr>
@@ -15331,7 +16113,7 @@
       </p:grpSpPr>
       <p:sp>
         <p:nvSpPr>
-          <p:cNvPr id="157" name="Google Shape;157;p13"/>
+          <p:cNvPr id="151" name="Google Shape;151;p12"/>
           <p:cNvSpPr txBox="1">
             <a:spLocks noGrp="1"/>
           </p:cNvSpPr>
@@ -15341,7 +16123,7 @@
         </p:nvSpPr>
         <p:spPr>
           <a:xfrm>
-            <a:off x="838200" y="365125"/>
+            <a:off x="838200" y="18255"/>
             <a:ext cx="10515600" cy="1325563"/>
           </a:xfrm>
           <a:prstGeom prst="rect">
@@ -15376,355 +16158,22 @@
               <a:buNone/>
             </a:pPr>
             <a:r>
-              <a:rPr lang="en-US"/>
-              <a:t>Tools for structural annotation</a:t>
+              <a:rPr lang="en-US" dirty="0"/>
+              <a:t>3. Structural annotation</a:t>
             </a:r>
-            <a:endParaRPr/>
+            <a:endParaRPr dirty="0"/>
           </a:p>
         </p:txBody>
       </p:sp>
       <p:sp>
         <p:nvSpPr>
-          <p:cNvPr id="158" name="Google Shape;158;p13"/>
-          <p:cNvSpPr txBox="1">
-            <a:spLocks noGrp="1"/>
-          </p:cNvSpPr>
-          <p:nvPr>
-            <p:ph type="body" idx="1"/>
-          </p:nvPr>
-        </p:nvSpPr>
-        <p:spPr>
-          <a:xfrm>
-            <a:off x="838200" y="1825625"/>
-            <a:ext cx="10515600" cy="4351338"/>
-          </a:xfrm>
-          <a:prstGeom prst="rect">
-            <a:avLst/>
-          </a:prstGeom>
-          <a:noFill/>
-          <a:ln>
-            <a:noFill/>
-          </a:ln>
-        </p:spPr>
-        <p:txBody>
-          <a:bodyPr spcFirstLastPara="1" wrap="square" lIns="91425" tIns="45700" rIns="91425" bIns="45700" anchor="t" anchorCtr="0">
-            <a:normAutofit fontScale="92500" lnSpcReduction="20000"/>
-          </a:bodyPr>
-          <a:lstStyle/>
-          <a:p>
-            <a:pPr marL="228600" lvl="0" indent="-228600" algn="l" rtl="0">
-              <a:lnSpc>
-                <a:spcPct val="90000"/>
-              </a:lnSpc>
-              <a:spcBef>
-                <a:spcPts val="0"/>
-              </a:spcBef>
-              <a:spcAft>
-                <a:spcPts val="0"/>
-              </a:spcAft>
-              <a:buClr>
-                <a:schemeClr val="dk1"/>
-              </a:buClr>
-              <a:buSzPct val="100000"/>
-              <a:buChar char="•"/>
-            </a:pPr>
-            <a:r>
-              <a:rPr lang="en-US"/>
-              <a:t>EDTA - the Extensive de novo TE Annotator</a:t>
-            </a:r>
-            <a:endParaRPr/>
-          </a:p>
-          <a:p>
-            <a:pPr marL="228600" lvl="0" indent="-228600" algn="l" rtl="0">
-              <a:lnSpc>
-                <a:spcPct val="90000"/>
-              </a:lnSpc>
-              <a:spcBef>
-                <a:spcPts val="1000"/>
-              </a:spcBef>
-              <a:spcAft>
-                <a:spcPts val="0"/>
-              </a:spcAft>
-              <a:buClr>
-                <a:schemeClr val="dk1"/>
-              </a:buClr>
-              <a:buSzPct val="100000"/>
-              <a:buChar char="•"/>
-            </a:pPr>
-            <a:r>
-              <a:rPr lang="en-US"/>
-              <a:t>Protexcluder</a:t>
-            </a:r>
-            <a:endParaRPr/>
-          </a:p>
-          <a:p>
-            <a:pPr marL="228600" lvl="0" indent="-228600" algn="l" rtl="0">
-              <a:lnSpc>
-                <a:spcPct val="90000"/>
-              </a:lnSpc>
-              <a:spcBef>
-                <a:spcPts val="1000"/>
-              </a:spcBef>
-              <a:spcAft>
-                <a:spcPts val="0"/>
-              </a:spcAft>
-              <a:buClr>
-                <a:schemeClr val="dk1"/>
-              </a:buClr>
-              <a:buSzPct val="100000"/>
-              <a:buChar char="•"/>
-            </a:pPr>
-            <a:r>
-              <a:rPr lang="en-US"/>
-              <a:t>RepeatModeler</a:t>
-            </a:r>
-            <a:endParaRPr/>
-          </a:p>
-          <a:p>
-            <a:pPr marL="228600" lvl="0" indent="-228600" algn="l" rtl="0">
-              <a:lnSpc>
-                <a:spcPct val="90000"/>
-              </a:lnSpc>
-              <a:spcBef>
-                <a:spcPts val="1000"/>
-              </a:spcBef>
-              <a:spcAft>
-                <a:spcPts val="0"/>
-              </a:spcAft>
-              <a:buClr>
-                <a:schemeClr val="dk1"/>
-              </a:buClr>
-              <a:buSzPct val="100000"/>
-              <a:buChar char="•"/>
-            </a:pPr>
-            <a:r>
-              <a:rPr lang="en-US"/>
-              <a:t>Repeatmasker</a:t>
-            </a:r>
-            <a:endParaRPr/>
-          </a:p>
-          <a:p>
-            <a:pPr marL="228600" lvl="0" indent="-228600" algn="l" rtl="0">
-              <a:lnSpc>
-                <a:spcPct val="90000"/>
-              </a:lnSpc>
-              <a:spcBef>
-                <a:spcPts val="1000"/>
-              </a:spcBef>
-              <a:spcAft>
-                <a:spcPts val="0"/>
-              </a:spcAft>
-              <a:buClr>
-                <a:schemeClr val="dk1"/>
-              </a:buClr>
-              <a:buSzPct val="100000"/>
-              <a:buChar char="•"/>
-            </a:pPr>
-            <a:r>
-              <a:rPr lang="en-US"/>
-              <a:t>Braker</a:t>
-            </a:r>
-            <a:endParaRPr/>
-          </a:p>
-          <a:p>
-            <a:pPr marL="228600" lvl="0" indent="-228600" algn="l" rtl="0">
-              <a:lnSpc>
-                <a:spcPct val="90000"/>
-              </a:lnSpc>
-              <a:spcBef>
-                <a:spcPts val="1000"/>
-              </a:spcBef>
-              <a:spcAft>
-                <a:spcPts val="0"/>
-              </a:spcAft>
-              <a:buClr>
-                <a:schemeClr val="dk1"/>
-              </a:buClr>
-              <a:buSzPct val="100000"/>
-              <a:buChar char="•"/>
-            </a:pPr>
-            <a:r>
-              <a:rPr lang="en-US"/>
-              <a:t>Augustus</a:t>
-            </a:r>
-            <a:endParaRPr/>
-          </a:p>
-          <a:p>
-            <a:pPr marL="228600" lvl="0" indent="-228600" algn="l" rtl="0">
-              <a:lnSpc>
-                <a:spcPct val="90000"/>
-              </a:lnSpc>
-              <a:spcBef>
-                <a:spcPts val="1000"/>
-              </a:spcBef>
-              <a:spcAft>
-                <a:spcPts val="0"/>
-              </a:spcAft>
-              <a:buClr>
-                <a:schemeClr val="dk1"/>
-              </a:buClr>
-              <a:buSzPct val="100000"/>
-              <a:buChar char="•"/>
-            </a:pPr>
-            <a:r>
-              <a:rPr lang="en-US"/>
-              <a:t>Snap</a:t>
-            </a:r>
-            <a:endParaRPr/>
-          </a:p>
-          <a:p>
-            <a:pPr marL="228600" lvl="0" indent="-228600" algn="l" rtl="0">
-              <a:lnSpc>
-                <a:spcPct val="90000"/>
-              </a:lnSpc>
-              <a:spcBef>
-                <a:spcPts val="1000"/>
-              </a:spcBef>
-              <a:spcAft>
-                <a:spcPts val="0"/>
-              </a:spcAft>
-              <a:buClr>
-                <a:schemeClr val="dk1"/>
-              </a:buClr>
-              <a:buSzPct val="100000"/>
-              <a:buChar char="•"/>
-            </a:pPr>
-            <a:r>
-              <a:rPr lang="en-US" strike="sngStrike"/>
-              <a:t>Maker</a:t>
-            </a:r>
-            <a:endParaRPr/>
-          </a:p>
-          <a:p>
-            <a:pPr marL="228600" lvl="0" indent="-228600" algn="l" rtl="0">
-              <a:lnSpc>
-                <a:spcPct val="90000"/>
-              </a:lnSpc>
-              <a:spcBef>
-                <a:spcPts val="1000"/>
-              </a:spcBef>
-              <a:spcAft>
-                <a:spcPts val="0"/>
-              </a:spcAft>
-              <a:buClr>
-                <a:schemeClr val="dk1"/>
-              </a:buClr>
-              <a:buSzPct val="100000"/>
-              <a:buChar char="•"/>
-            </a:pPr>
-            <a:r>
-              <a:rPr lang="en-US"/>
-              <a:t>Apollo</a:t>
-            </a:r>
-            <a:endParaRPr/>
-          </a:p>
-          <a:p>
-            <a:pPr marL="228600" lvl="0" indent="-228600" algn="l" rtl="0">
-              <a:lnSpc>
-                <a:spcPct val="90000"/>
-              </a:lnSpc>
-              <a:spcBef>
-                <a:spcPts val="1000"/>
-              </a:spcBef>
-              <a:spcAft>
-                <a:spcPts val="0"/>
-              </a:spcAft>
-              <a:buClr>
-                <a:schemeClr val="dk1"/>
-              </a:buClr>
-              <a:buSzPct val="100000"/>
-              <a:buChar char="•"/>
-            </a:pPr>
-            <a:r>
-              <a:rPr lang="en-US"/>
-              <a:t>BUSCO</a:t>
-            </a:r>
-            <a:endParaRPr/>
-          </a:p>
-        </p:txBody>
-      </p:sp>
-    </p:spTree>
-  </p:cSld>
-  <p:clrMapOvr>
-    <a:masterClrMapping/>
-  </p:clrMapOvr>
-</p:sld>
-</file>
-
-<file path=ppt/slides/slide19.xml><?xml version="1.0" encoding="utf-8"?>
-<p:sld xmlns:a="http://schemas.openxmlformats.org/drawingml/2006/main" xmlns:r="http://schemas.openxmlformats.org/officeDocument/2006/relationships" xmlns:p="http://schemas.openxmlformats.org/presentationml/2006/main">
-  <p:cSld>
-    <p:spTree>
-      <p:nvGrpSpPr>
-        <p:cNvPr id="1" name="Shape 162"/>
-        <p:cNvGrpSpPr/>
-        <p:nvPr/>
-      </p:nvGrpSpPr>
-      <p:grpSpPr>
-        <a:xfrm>
-          <a:off x="0" y="0"/>
-          <a:ext cx="0" cy="0"/>
-          <a:chOff x="0" y="0"/>
-          <a:chExt cx="0" cy="0"/>
-        </a:xfrm>
-      </p:grpSpPr>
-      <p:sp>
-        <p:nvSpPr>
-          <p:cNvPr id="163" name="Google Shape;163;p14"/>
-          <p:cNvSpPr txBox="1">
-            <a:spLocks noGrp="1"/>
-          </p:cNvSpPr>
-          <p:nvPr>
-            <p:ph type="title"/>
-          </p:nvPr>
-        </p:nvSpPr>
-        <p:spPr>
-          <a:xfrm>
-            <a:off x="838200" y="365125"/>
-            <a:ext cx="10515600" cy="1325563"/>
-          </a:xfrm>
-          <a:prstGeom prst="rect">
-            <a:avLst/>
-          </a:prstGeom>
-          <a:noFill/>
-          <a:ln>
-            <a:noFill/>
-          </a:ln>
-        </p:spPr>
-        <p:txBody>
-          <a:bodyPr spcFirstLastPara="1" wrap="square" lIns="91425" tIns="45700" rIns="91425" bIns="45700" anchor="ctr" anchorCtr="0">
-            <a:normAutofit/>
-          </a:bodyPr>
-          <a:lstStyle/>
-          <a:p>
-            <a:pPr marL="0" lvl="0" indent="0" algn="l" rtl="0">
-              <a:lnSpc>
-                <a:spcPct val="90000"/>
-              </a:lnSpc>
-              <a:spcBef>
-                <a:spcPts val="0"/>
-              </a:spcBef>
-              <a:spcAft>
-                <a:spcPts val="0"/>
-              </a:spcAft>
-              <a:buClr>
-                <a:schemeClr val="dk1"/>
-              </a:buClr>
-              <a:buSzPts val="4400"/>
-              <a:buFont typeface="Play"/>
-              <a:buNone/>
-            </a:pPr>
-            <a:r>
-              <a:rPr lang="en-US"/>
-              <a:t>Tools for functional annotation</a:t>
-            </a:r>
-            <a:endParaRPr/>
-          </a:p>
-        </p:txBody>
-      </p:sp>
-      <p:sp>
-        <p:nvSpPr>
-          <p:cNvPr id="164" name="Google Shape;164;p14"/>
+          <p:cNvPr id="2" name="Google Shape;146;p11">
+            <a:extLst>
+              <a:ext uri="{FF2B5EF4-FFF2-40B4-BE49-F238E27FC236}">
+                <a16:creationId xmlns:a16="http://schemas.microsoft.com/office/drawing/2014/main" id="{E78C3F95-DD55-2199-449A-4DDF3648AF25}"/>
+              </a:ext>
+            </a:extLst>
+          </p:cNvPr>
           <p:cNvSpPr txBox="1">
             <a:spLocks noGrp="1"/>
           </p:cNvSpPr>
@@ -15759,7 +16208,7 @@
                 <a:spcPts val="0"/>
               </a:spcBef>
               <a:spcAft>
-                <a:spcPts val="0"/>
+                <a:spcPts val="600"/>
               </a:spcAft>
               <a:buClr>
                 <a:schemeClr val="dk1"/>
@@ -15768,10 +16217,9 @@
               <a:buChar char="•"/>
             </a:pPr>
             <a:r>
-              <a:rPr lang="en-US"/>
-              <a:t>BLAST</a:t>
+              <a:rPr lang="en-US" dirty="0"/>
+              <a:t>structural annotation also includes aligning gene evidence such as RNA and protein sequences to the genome</a:t>
             </a:r>
-            <a:endParaRPr/>
           </a:p>
           <a:p>
             <a:pPr marL="228600" lvl="0" indent="-228600" algn="l" rtl="0">
@@ -15779,10 +16227,10 @@
                 <a:spcPct val="90000"/>
               </a:lnSpc>
               <a:spcBef>
-                <a:spcPts val="1000"/>
-              </a:spcBef>
-              <a:spcAft>
-                <a:spcPts val="0"/>
+                <a:spcPts val="0"/>
+              </a:spcBef>
+              <a:spcAft>
+                <a:spcPts val="600"/>
               </a:spcAft>
               <a:buClr>
                 <a:schemeClr val="dk1"/>
@@ -15791,10 +16239,26 @@
               <a:buChar char="•"/>
             </a:pPr>
             <a:r>
-              <a:rPr lang="en-US"/>
-              <a:t>Diamond</a:t>
+              <a:rPr lang="en-US" dirty="0"/>
+              <a:t>output is generally </a:t>
             </a:r>
-            <a:endParaRPr/>
+            <a:r>
+              <a:rPr lang="en-US" dirty="0" err="1"/>
+              <a:t>gff</a:t>
+            </a:r>
+            <a:r>
+              <a:rPr lang="en-US" dirty="0"/>
+              <a:t>, bam, or </a:t>
+            </a:r>
+            <a:r>
+              <a:rPr lang="en-US" dirty="0" err="1"/>
+              <a:t>vcf</a:t>
+            </a:r>
+            <a:r>
+              <a:rPr lang="en-US" dirty="0"/>
+              <a:t> files</a:t>
+            </a:r>
+            <a:endParaRPr dirty="0"/>
           </a:p>
           <a:p>
             <a:pPr marL="228600" lvl="0" indent="-228600" algn="l" rtl="0">
@@ -15814,60 +16278,58 @@
               <a:buChar char="•"/>
             </a:pPr>
             <a:r>
-              <a:rPr lang="en-US"/>
-              <a:t>InterProScan</a:t>
+              <a:rPr lang="en-US" dirty="0"/>
+              <a:t>Tools:</a:t>
             </a:r>
-            <a:endParaRPr/>
-          </a:p>
-          <a:p>
-            <a:pPr marL="228600" lvl="0" indent="-228600" algn="l" rtl="0">
-              <a:lnSpc>
-                <a:spcPct val="90000"/>
-              </a:lnSpc>
+          </a:p>
+          <a:p>
+            <a:pPr marL="685800" lvl="1" indent="-228600">
               <a:spcBef>
                 <a:spcPts val="1000"/>
               </a:spcBef>
-              <a:spcAft>
-                <a:spcPts val="0"/>
-              </a:spcAft>
-              <a:buClr>
-                <a:schemeClr val="dk1"/>
-              </a:buClr>
               <a:buSzPts val="2800"/>
-              <a:buChar char="•"/>
             </a:pPr>
             <a:r>
-              <a:rPr lang="en-US"/>
-              <a:t>Mercator</a:t>
+              <a:rPr lang="en-US" dirty="0"/>
+              <a:t>Hisat2 - align RNA-seq</a:t>
             </a:r>
-            <a:endParaRPr/>
-          </a:p>
-          <a:p>
-            <a:pPr marL="228600" lvl="0" indent="-228600" algn="l" rtl="0">
-              <a:lnSpc>
-                <a:spcPct val="90000"/>
-              </a:lnSpc>
+          </a:p>
+          <a:p>
+            <a:pPr marL="685800" lvl="1" indent="-228600">
               <a:spcBef>
                 <a:spcPts val="1000"/>
               </a:spcBef>
-              <a:spcAft>
-                <a:spcPts val="0"/>
-              </a:spcAft>
-              <a:buClr>
-                <a:schemeClr val="dk1"/>
-              </a:buClr>
               <a:buSzPts val="2800"/>
-              <a:buChar char="•"/>
             </a:pPr>
             <a:r>
-              <a:rPr lang="en-US"/>
-              <a:t>Databases: Swiss-prot, Trembl, nr, InterPro</a:t>
+              <a:rPr lang="en-US" dirty="0" err="1"/>
+              <a:t>Gmap</a:t>
             </a:r>
-            <a:endParaRPr/>
+            <a:r>
+              <a:rPr lang="en-US" dirty="0"/>
+              <a:t> - align mRNA</a:t>
+            </a:r>
+          </a:p>
+          <a:p>
+            <a:pPr marL="685800" lvl="1" indent="-228600">
+              <a:spcBef>
+                <a:spcPts val="1000"/>
+              </a:spcBef>
+              <a:buSzPts val="2800"/>
+            </a:pPr>
+            <a:r>
+              <a:rPr lang="en-US" dirty="0"/>
+              <a:t>StringTie2 - transcriptome assembly</a:t>
+            </a:r>
           </a:p>
         </p:txBody>
       </p:sp>
     </p:spTree>
+    <p:extLst>
+      <p:ext uri="{BB962C8B-B14F-4D97-AF65-F5344CB8AC3E}">
+        <p14:creationId xmlns:p14="http://schemas.microsoft.com/office/powerpoint/2010/main" val="3360083710"/>
+      </p:ext>
+    </p:extLst>
   </p:cSld>
   <p:clrMapOvr>
     <a:masterClrMapping/>
@@ -15996,6 +16458,1188 @@
   <p:cSld>
     <p:spTree>
       <p:nvGrpSpPr>
+        <p:cNvPr id="1" name="Shape 150"/>
+        <p:cNvGrpSpPr/>
+        <p:nvPr/>
+      </p:nvGrpSpPr>
+      <p:grpSpPr>
+        <a:xfrm>
+          <a:off x="0" y="0"/>
+          <a:ext cx="0" cy="0"/>
+          <a:chOff x="0" y="0"/>
+          <a:chExt cx="0" cy="0"/>
+        </a:xfrm>
+      </p:grpSpPr>
+      <p:sp>
+        <p:nvSpPr>
+          <p:cNvPr id="151" name="Google Shape;151;p12"/>
+          <p:cNvSpPr txBox="1">
+            <a:spLocks noGrp="1"/>
+          </p:cNvSpPr>
+          <p:nvPr>
+            <p:ph type="title"/>
+          </p:nvPr>
+        </p:nvSpPr>
+        <p:spPr>
+          <a:xfrm>
+            <a:off x="838200" y="18255"/>
+            <a:ext cx="10515600" cy="1325563"/>
+          </a:xfrm>
+          <a:prstGeom prst="rect">
+            <a:avLst/>
+          </a:prstGeom>
+          <a:noFill/>
+          <a:ln>
+            <a:noFill/>
+          </a:ln>
+        </p:spPr>
+        <p:txBody>
+          <a:bodyPr spcFirstLastPara="1" wrap="square" lIns="91425" tIns="45700" rIns="91425" bIns="45700" anchor="ctr" anchorCtr="0">
+            <a:normAutofit/>
+          </a:bodyPr>
+          <a:lstStyle/>
+          <a:p>
+            <a:pPr marL="0" lvl="0" indent="0" algn="l" rtl="0">
+              <a:lnSpc>
+                <a:spcPct val="90000"/>
+              </a:lnSpc>
+              <a:spcBef>
+                <a:spcPts val="0"/>
+              </a:spcBef>
+              <a:spcAft>
+                <a:spcPts val="0"/>
+              </a:spcAft>
+              <a:buClr>
+                <a:schemeClr val="dk1"/>
+              </a:buClr>
+              <a:buSzPts val="4400"/>
+              <a:buFont typeface="Play"/>
+              <a:buNone/>
+            </a:pPr>
+            <a:r>
+              <a:rPr lang="en-US" dirty="0"/>
+              <a:t>3. Structural annotation: pipelines</a:t>
+            </a:r>
+            <a:endParaRPr dirty="0"/>
+          </a:p>
+        </p:txBody>
+      </p:sp>
+      <p:sp>
+        <p:nvSpPr>
+          <p:cNvPr id="2" name="Google Shape;146;p11">
+            <a:extLst>
+              <a:ext uri="{FF2B5EF4-FFF2-40B4-BE49-F238E27FC236}">
+                <a16:creationId xmlns:a16="http://schemas.microsoft.com/office/drawing/2014/main" id="{557CCD4A-EB44-8084-FFF5-33D11A6A99D1}"/>
+              </a:ext>
+            </a:extLst>
+          </p:cNvPr>
+          <p:cNvSpPr txBox="1">
+            <a:spLocks noGrp="1"/>
+          </p:cNvSpPr>
+          <p:nvPr>
+            <p:ph type="body" idx="1"/>
+          </p:nvPr>
+        </p:nvSpPr>
+        <p:spPr>
+          <a:xfrm>
+            <a:off x="838200" y="1825625"/>
+            <a:ext cx="10515600" cy="4351338"/>
+          </a:xfrm>
+          <a:prstGeom prst="rect">
+            <a:avLst/>
+          </a:prstGeom>
+          <a:noFill/>
+          <a:ln>
+            <a:noFill/>
+          </a:ln>
+        </p:spPr>
+        <p:txBody>
+          <a:bodyPr spcFirstLastPara="1" wrap="square" lIns="91425" tIns="45700" rIns="91425" bIns="45700" anchor="t" anchorCtr="0">
+            <a:normAutofit/>
+          </a:bodyPr>
+          <a:lstStyle/>
+          <a:p>
+            <a:pPr marL="228600" lvl="0" indent="-228600" algn="l" rtl="0">
+              <a:lnSpc>
+                <a:spcPct val="90000"/>
+              </a:lnSpc>
+              <a:spcBef>
+                <a:spcPts val="0"/>
+              </a:spcBef>
+              <a:spcAft>
+                <a:spcPts val="600"/>
+              </a:spcAft>
+              <a:buClr>
+                <a:schemeClr val="dk1"/>
+              </a:buClr>
+              <a:buSzPts val="2800"/>
+              <a:buChar char="•"/>
+            </a:pPr>
+            <a:r>
+              <a:rPr lang="en-US" dirty="0"/>
+              <a:t>combines different tools into a pipeline to include both ab initio and evidence-based annotation</a:t>
+            </a:r>
+          </a:p>
+          <a:p>
+            <a:pPr marL="228600" lvl="0" indent="-228600" algn="l" rtl="0">
+              <a:lnSpc>
+                <a:spcPct val="90000"/>
+              </a:lnSpc>
+              <a:spcBef>
+                <a:spcPts val="0"/>
+              </a:spcBef>
+              <a:spcAft>
+                <a:spcPts val="600"/>
+              </a:spcAft>
+              <a:buClr>
+                <a:schemeClr val="dk1"/>
+              </a:buClr>
+              <a:buSzPts val="2800"/>
+              <a:buChar char="•"/>
+            </a:pPr>
+            <a:r>
+              <a:rPr lang="en-US" dirty="0"/>
+              <a:t>Tools:</a:t>
+            </a:r>
+          </a:p>
+          <a:p>
+            <a:pPr marL="685800" lvl="1" indent="-228600">
+              <a:spcBef>
+                <a:spcPts val="0"/>
+              </a:spcBef>
+              <a:spcAft>
+                <a:spcPts val="600"/>
+              </a:spcAft>
+              <a:buSzPts val="2800"/>
+            </a:pPr>
+            <a:r>
+              <a:rPr lang="en-US" dirty="0"/>
+              <a:t>BRAKER - </a:t>
+            </a:r>
+            <a:r>
+              <a:rPr lang="en-US" dirty="0">
+                <a:hlinkClick r:id="rId3"/>
+              </a:rPr>
+              <a:t>https://github.com/Gaius-Augustus/BRAKER</a:t>
+            </a:r>
+            <a:endParaRPr lang="en-US" dirty="0"/>
+          </a:p>
+          <a:p>
+            <a:pPr marL="685800" lvl="1" indent="-228600">
+              <a:spcBef>
+                <a:spcPts val="0"/>
+              </a:spcBef>
+              <a:spcAft>
+                <a:spcPts val="600"/>
+              </a:spcAft>
+              <a:buSzPts val="2800"/>
+            </a:pPr>
+            <a:r>
+              <a:rPr lang="en-US" dirty="0"/>
+              <a:t>EASEL - </a:t>
+            </a:r>
+            <a:r>
+              <a:rPr lang="en-US" dirty="0">
+                <a:hlinkClick r:id="rId4"/>
+              </a:rPr>
+              <a:t>https://gitlab.com/PlantGenomicsLab/easel</a:t>
+            </a:r>
+            <a:endParaRPr lang="en-US" dirty="0"/>
+          </a:p>
+          <a:p>
+            <a:pPr marL="457200" lvl="1" indent="0">
+              <a:spcBef>
+                <a:spcPts val="0"/>
+              </a:spcBef>
+              <a:spcAft>
+                <a:spcPts val="600"/>
+              </a:spcAft>
+              <a:buSzPts val="2800"/>
+              <a:buNone/>
+            </a:pPr>
+            <a:endParaRPr lang="en-US" dirty="0"/>
+          </a:p>
+          <a:p>
+            <a:pPr marL="685800" lvl="1" indent="-228600">
+              <a:spcBef>
+                <a:spcPts val="0"/>
+              </a:spcBef>
+              <a:spcAft>
+                <a:spcPts val="600"/>
+              </a:spcAft>
+              <a:buSzPts val="2800"/>
+            </a:pPr>
+            <a:endParaRPr dirty="0"/>
+          </a:p>
+        </p:txBody>
+      </p:sp>
+    </p:spTree>
+    <p:extLst>
+      <p:ext uri="{BB962C8B-B14F-4D97-AF65-F5344CB8AC3E}">
+        <p14:creationId xmlns:p14="http://schemas.microsoft.com/office/powerpoint/2010/main" val="1450376329"/>
+      </p:ext>
+    </p:extLst>
+  </p:cSld>
+  <p:clrMapOvr>
+    <a:masterClrMapping/>
+  </p:clrMapOvr>
+</p:sld>
+</file>
+
+<file path=ppt/slides/slide21.xml><?xml version="1.0" encoding="utf-8"?>
+<p:sld xmlns:a="http://schemas.openxmlformats.org/drawingml/2006/main" xmlns:r="http://schemas.openxmlformats.org/officeDocument/2006/relationships" xmlns:p="http://schemas.openxmlformats.org/presentationml/2006/main">
+  <p:cSld>
+    <p:spTree>
+      <p:nvGrpSpPr>
+        <p:cNvPr id="1" name="Shape 150"/>
+        <p:cNvGrpSpPr/>
+        <p:nvPr/>
+      </p:nvGrpSpPr>
+      <p:grpSpPr>
+        <a:xfrm>
+          <a:off x="0" y="0"/>
+          <a:ext cx="0" cy="0"/>
+          <a:chOff x="0" y="0"/>
+          <a:chExt cx="0" cy="0"/>
+        </a:xfrm>
+      </p:grpSpPr>
+      <p:sp>
+        <p:nvSpPr>
+          <p:cNvPr id="151" name="Google Shape;151;p12"/>
+          <p:cNvSpPr txBox="1">
+            <a:spLocks noGrp="1"/>
+          </p:cNvSpPr>
+          <p:nvPr>
+            <p:ph type="title"/>
+          </p:nvPr>
+        </p:nvSpPr>
+        <p:spPr>
+          <a:xfrm>
+            <a:off x="838200" y="18255"/>
+            <a:ext cx="10515600" cy="1325563"/>
+          </a:xfrm>
+          <a:prstGeom prst="rect">
+            <a:avLst/>
+          </a:prstGeom>
+          <a:noFill/>
+          <a:ln>
+            <a:noFill/>
+          </a:ln>
+        </p:spPr>
+        <p:txBody>
+          <a:bodyPr spcFirstLastPara="1" wrap="square" lIns="91425" tIns="45700" rIns="91425" bIns="45700" anchor="ctr" anchorCtr="0">
+            <a:normAutofit/>
+          </a:bodyPr>
+          <a:lstStyle/>
+          <a:p>
+            <a:pPr marL="0" lvl="0" indent="0" algn="l" rtl="0">
+              <a:lnSpc>
+                <a:spcPct val="90000"/>
+              </a:lnSpc>
+              <a:spcBef>
+                <a:spcPts val="0"/>
+              </a:spcBef>
+              <a:spcAft>
+                <a:spcPts val="0"/>
+              </a:spcAft>
+              <a:buClr>
+                <a:schemeClr val="dk1"/>
+              </a:buClr>
+              <a:buSzPts val="4400"/>
+              <a:buFont typeface="Play"/>
+              <a:buNone/>
+            </a:pPr>
+            <a:r>
+              <a:rPr lang="en-US" dirty="0"/>
+              <a:t>3 + 4. Structural (and functional!)  annotation</a:t>
+            </a:r>
+            <a:endParaRPr dirty="0"/>
+          </a:p>
+        </p:txBody>
+      </p:sp>
+      <p:sp>
+        <p:nvSpPr>
+          <p:cNvPr id="2" name="Google Shape;146;p11">
+            <a:extLst>
+              <a:ext uri="{FF2B5EF4-FFF2-40B4-BE49-F238E27FC236}">
+                <a16:creationId xmlns:a16="http://schemas.microsoft.com/office/drawing/2014/main" id="{E78C3F95-DD55-2199-449A-4DDF3648AF25}"/>
+              </a:ext>
+            </a:extLst>
+          </p:cNvPr>
+          <p:cNvSpPr txBox="1">
+            <a:spLocks noGrp="1"/>
+          </p:cNvSpPr>
+          <p:nvPr>
+            <p:ph type="body" idx="1"/>
+          </p:nvPr>
+        </p:nvSpPr>
+        <p:spPr>
+          <a:xfrm>
+            <a:off x="838200" y="1825625"/>
+            <a:ext cx="10515600" cy="4351338"/>
+          </a:xfrm>
+          <a:prstGeom prst="rect">
+            <a:avLst/>
+          </a:prstGeom>
+          <a:noFill/>
+          <a:ln>
+            <a:noFill/>
+          </a:ln>
+        </p:spPr>
+        <p:txBody>
+          <a:bodyPr spcFirstLastPara="1" wrap="square" lIns="91425" tIns="45700" rIns="91425" bIns="45700" anchor="t" anchorCtr="0">
+            <a:normAutofit/>
+          </a:bodyPr>
+          <a:lstStyle/>
+          <a:p>
+            <a:pPr marL="228600" lvl="0" indent="-228600" algn="l" rtl="0">
+              <a:lnSpc>
+                <a:spcPct val="90000"/>
+              </a:lnSpc>
+              <a:spcBef>
+                <a:spcPts val="0"/>
+              </a:spcBef>
+              <a:spcAft>
+                <a:spcPts val="600"/>
+              </a:spcAft>
+              <a:buClr>
+                <a:schemeClr val="dk1"/>
+              </a:buClr>
+              <a:buSzPts val="2800"/>
+              <a:buChar char="•"/>
+            </a:pPr>
+            <a:r>
+              <a:rPr lang="en-US" dirty="0"/>
+              <a:t>EASEL is written as a </a:t>
+            </a:r>
+            <a:r>
+              <a:rPr lang="en-US" dirty="0" err="1"/>
+              <a:t>nextflow</a:t>
+            </a:r>
+            <a:r>
+              <a:rPr lang="en-US" dirty="0"/>
+              <a:t> pipeline to run the entire annotation process instead of working step-by-step</a:t>
+            </a:r>
+            <a:endParaRPr dirty="0"/>
+          </a:p>
+          <a:p>
+            <a:pPr marL="228600" lvl="0" indent="-228600" algn="l" rtl="0">
+              <a:lnSpc>
+                <a:spcPct val="90000"/>
+              </a:lnSpc>
+              <a:spcBef>
+                <a:spcPts val="1000"/>
+              </a:spcBef>
+              <a:spcAft>
+                <a:spcPts val="0"/>
+              </a:spcAft>
+              <a:buClr>
+                <a:schemeClr val="dk1"/>
+              </a:buClr>
+              <a:buSzPts val="2800"/>
+              <a:buChar char="•"/>
+            </a:pPr>
+            <a:r>
+              <a:rPr lang="en-US" dirty="0"/>
+              <a:t>includes pre-processing of RNA data, alignment to the genome, as well as structural and functional annotations</a:t>
+            </a:r>
+          </a:p>
+          <a:p>
+            <a:pPr marL="228600" lvl="0" indent="-228600" algn="l" rtl="0">
+              <a:lnSpc>
+                <a:spcPct val="90000"/>
+              </a:lnSpc>
+              <a:spcBef>
+                <a:spcPts val="1000"/>
+              </a:spcBef>
+              <a:spcAft>
+                <a:spcPts val="0"/>
+              </a:spcAft>
+              <a:buClr>
+                <a:schemeClr val="dk1"/>
+              </a:buClr>
+              <a:buSzPts val="2800"/>
+              <a:buChar char="•"/>
+            </a:pPr>
+            <a:r>
+              <a:rPr lang="en-US" dirty="0"/>
+              <a:t>requires the install of </a:t>
+            </a:r>
+            <a:r>
+              <a:rPr lang="en-US" dirty="0" err="1"/>
+              <a:t>Nextflow</a:t>
+            </a:r>
+            <a:r>
+              <a:rPr lang="en-US" dirty="0"/>
+              <a:t> and Docker/Singularity as well as GNU utilities</a:t>
+            </a:r>
+          </a:p>
+          <a:p>
+            <a:pPr marL="228600" lvl="0" indent="-228600" algn="l" rtl="0">
+              <a:lnSpc>
+                <a:spcPct val="90000"/>
+              </a:lnSpc>
+              <a:spcBef>
+                <a:spcPts val="1000"/>
+              </a:spcBef>
+              <a:spcAft>
+                <a:spcPts val="0"/>
+              </a:spcAft>
+              <a:buClr>
+                <a:schemeClr val="dk1"/>
+              </a:buClr>
+              <a:buSzPts val="2800"/>
+              <a:buChar char="•"/>
+            </a:pPr>
+            <a:r>
+              <a:rPr lang="en-US" dirty="0"/>
+              <a:t>uses AUGUSTUS to predict gene models</a:t>
+            </a:r>
+          </a:p>
+          <a:p>
+            <a:pPr marL="228600" lvl="0" indent="-228600" algn="l" rtl="0">
+              <a:lnSpc>
+                <a:spcPct val="90000"/>
+              </a:lnSpc>
+              <a:spcBef>
+                <a:spcPts val="1000"/>
+              </a:spcBef>
+              <a:spcAft>
+                <a:spcPts val="0"/>
+              </a:spcAft>
+              <a:buClr>
+                <a:schemeClr val="dk1"/>
+              </a:buClr>
+              <a:buSzPts val="2800"/>
+              <a:buChar char="•"/>
+            </a:pPr>
+            <a:r>
+              <a:rPr lang="en-US" dirty="0">
+                <a:hlinkClick r:id="rId3"/>
+              </a:rPr>
+              <a:t>https://gitlab.com/PlantGenomicsLab/easel#what-is-easel</a:t>
+            </a:r>
+            <a:r>
+              <a:rPr lang="en-US" dirty="0"/>
+              <a:t> </a:t>
+            </a:r>
+            <a:endParaRPr dirty="0"/>
+          </a:p>
+          <a:p>
+            <a:pPr marL="228600" lvl="0" indent="-50800" algn="l" rtl="0">
+              <a:lnSpc>
+                <a:spcPct val="90000"/>
+              </a:lnSpc>
+              <a:spcBef>
+                <a:spcPts val="1000"/>
+              </a:spcBef>
+              <a:spcAft>
+                <a:spcPts val="0"/>
+              </a:spcAft>
+              <a:buClr>
+                <a:schemeClr val="dk1"/>
+              </a:buClr>
+              <a:buSzPts val="2800"/>
+              <a:buNone/>
+            </a:pPr>
+            <a:endParaRPr dirty="0"/>
+          </a:p>
+        </p:txBody>
+      </p:sp>
+    </p:spTree>
+    <p:extLst>
+      <p:ext uri="{BB962C8B-B14F-4D97-AF65-F5344CB8AC3E}">
+        <p14:creationId xmlns:p14="http://schemas.microsoft.com/office/powerpoint/2010/main" val="1557196692"/>
+      </p:ext>
+    </p:extLst>
+  </p:cSld>
+  <p:clrMapOvr>
+    <a:masterClrMapping/>
+  </p:clrMapOvr>
+</p:sld>
+</file>
+
+<file path=ppt/slides/slide22.xml><?xml version="1.0" encoding="utf-8"?>
+<p:sld xmlns:a="http://schemas.openxmlformats.org/drawingml/2006/main" xmlns:r="http://schemas.openxmlformats.org/officeDocument/2006/relationships" xmlns:p="http://schemas.openxmlformats.org/presentationml/2006/main">
+  <p:cSld>
+    <p:spTree>
+      <p:nvGrpSpPr>
+        <p:cNvPr id="1" name="Shape 150"/>
+        <p:cNvGrpSpPr/>
+        <p:nvPr/>
+      </p:nvGrpSpPr>
+      <p:grpSpPr>
+        <a:xfrm>
+          <a:off x="0" y="0"/>
+          <a:ext cx="0" cy="0"/>
+          <a:chOff x="0" y="0"/>
+          <a:chExt cx="0" cy="0"/>
+        </a:xfrm>
+      </p:grpSpPr>
+      <p:sp>
+        <p:nvSpPr>
+          <p:cNvPr id="151" name="Google Shape;151;p12"/>
+          <p:cNvSpPr txBox="1">
+            <a:spLocks noGrp="1"/>
+          </p:cNvSpPr>
+          <p:nvPr>
+            <p:ph type="title"/>
+          </p:nvPr>
+        </p:nvSpPr>
+        <p:spPr>
+          <a:xfrm>
+            <a:off x="838200" y="18255"/>
+            <a:ext cx="10515600" cy="1325563"/>
+          </a:xfrm>
+          <a:prstGeom prst="rect">
+            <a:avLst/>
+          </a:prstGeom>
+          <a:noFill/>
+          <a:ln>
+            <a:noFill/>
+          </a:ln>
+        </p:spPr>
+        <p:txBody>
+          <a:bodyPr spcFirstLastPara="1" wrap="square" lIns="91425" tIns="45700" rIns="91425" bIns="45700" anchor="ctr" anchorCtr="0">
+            <a:normAutofit/>
+          </a:bodyPr>
+          <a:lstStyle/>
+          <a:p>
+            <a:pPr marL="0" lvl="0" indent="0" algn="l" rtl="0">
+              <a:lnSpc>
+                <a:spcPct val="90000"/>
+              </a:lnSpc>
+              <a:spcBef>
+                <a:spcPts val="0"/>
+              </a:spcBef>
+              <a:spcAft>
+                <a:spcPts val="0"/>
+              </a:spcAft>
+              <a:buClr>
+                <a:schemeClr val="dk1"/>
+              </a:buClr>
+              <a:buSzPts val="4400"/>
+              <a:buFont typeface="Play"/>
+              <a:buNone/>
+            </a:pPr>
+            <a:r>
+              <a:rPr lang="en-US"/>
+              <a:t>3 + 4. Structural and functional annotation</a:t>
+            </a:r>
+          </a:p>
+        </p:txBody>
+      </p:sp>
+      <p:pic>
+        <p:nvPicPr>
+          <p:cNvPr id="2" name="Picture 1">
+            <a:extLst>
+              <a:ext uri="{FF2B5EF4-FFF2-40B4-BE49-F238E27FC236}">
+                <a16:creationId xmlns:a16="http://schemas.microsoft.com/office/drawing/2014/main" id="{139650D1-0A0F-8837-1758-5A791E81F846}"/>
+              </a:ext>
+            </a:extLst>
+          </p:cNvPr>
+          <p:cNvPicPr>
+            <a:picLocks noChangeAspect="1"/>
+          </p:cNvPicPr>
+          <p:nvPr/>
+        </p:nvPicPr>
+        <p:blipFill>
+          <a:blip r:embed="rId3"/>
+          <a:stretch>
+            <a:fillRect/>
+          </a:stretch>
+        </p:blipFill>
+        <p:spPr>
+          <a:xfrm>
+            <a:off x="2497182" y="1343818"/>
+            <a:ext cx="7772400" cy="5023899"/>
+          </a:xfrm>
+          <a:prstGeom prst="rect">
+            <a:avLst/>
+          </a:prstGeom>
+        </p:spPr>
+      </p:pic>
+    </p:spTree>
+    <p:extLst>
+      <p:ext uri="{BB962C8B-B14F-4D97-AF65-F5344CB8AC3E}">
+        <p14:creationId xmlns:p14="http://schemas.microsoft.com/office/powerpoint/2010/main" val="1168715919"/>
+      </p:ext>
+    </p:extLst>
+  </p:cSld>
+  <p:clrMapOvr>
+    <a:masterClrMapping/>
+  </p:clrMapOvr>
+</p:sld>
+</file>
+
+<file path=ppt/slides/slide23.xml><?xml version="1.0" encoding="utf-8"?>
+<p:sld xmlns:a="http://schemas.openxmlformats.org/drawingml/2006/main" xmlns:r="http://schemas.openxmlformats.org/officeDocument/2006/relationships" xmlns:p="http://schemas.openxmlformats.org/presentationml/2006/main">
+  <p:cSld>
+    <p:spTree>
+      <p:nvGrpSpPr>
+        <p:cNvPr id="1" name="Shape 156"/>
+        <p:cNvGrpSpPr/>
+        <p:nvPr/>
+      </p:nvGrpSpPr>
+      <p:grpSpPr>
+        <a:xfrm>
+          <a:off x="0" y="0"/>
+          <a:ext cx="0" cy="0"/>
+          <a:chOff x="0" y="0"/>
+          <a:chExt cx="0" cy="0"/>
+        </a:xfrm>
+      </p:grpSpPr>
+      <p:sp>
+        <p:nvSpPr>
+          <p:cNvPr id="157" name="Google Shape;157;p13"/>
+          <p:cNvSpPr txBox="1">
+            <a:spLocks noGrp="1"/>
+          </p:cNvSpPr>
+          <p:nvPr>
+            <p:ph type="title"/>
+          </p:nvPr>
+        </p:nvSpPr>
+        <p:spPr>
+          <a:xfrm>
+            <a:off x="838200" y="365125"/>
+            <a:ext cx="10515600" cy="1325563"/>
+          </a:xfrm>
+          <a:prstGeom prst="rect">
+            <a:avLst/>
+          </a:prstGeom>
+          <a:noFill/>
+          <a:ln>
+            <a:noFill/>
+          </a:ln>
+        </p:spPr>
+        <p:txBody>
+          <a:bodyPr spcFirstLastPara="1" wrap="square" lIns="91425" tIns="45700" rIns="91425" bIns="45700" anchor="ctr" anchorCtr="0">
+            <a:normAutofit/>
+          </a:bodyPr>
+          <a:lstStyle/>
+          <a:p>
+            <a:pPr marL="0" lvl="0" indent="0" algn="l" rtl="0">
+              <a:lnSpc>
+                <a:spcPct val="90000"/>
+              </a:lnSpc>
+              <a:spcBef>
+                <a:spcPts val="0"/>
+              </a:spcBef>
+              <a:spcAft>
+                <a:spcPts val="0"/>
+              </a:spcAft>
+              <a:buClr>
+                <a:schemeClr val="dk1"/>
+              </a:buClr>
+              <a:buSzPts val="4400"/>
+              <a:buFont typeface="Play"/>
+              <a:buNone/>
+            </a:pPr>
+            <a:r>
+              <a:rPr lang="en-US"/>
+              <a:t>Tools for structural annotation</a:t>
+            </a:r>
+            <a:endParaRPr/>
+          </a:p>
+        </p:txBody>
+      </p:sp>
+      <p:sp>
+        <p:nvSpPr>
+          <p:cNvPr id="158" name="Google Shape;158;p13"/>
+          <p:cNvSpPr txBox="1">
+            <a:spLocks noGrp="1"/>
+          </p:cNvSpPr>
+          <p:nvPr>
+            <p:ph type="body" idx="1"/>
+          </p:nvPr>
+        </p:nvSpPr>
+        <p:spPr>
+          <a:xfrm>
+            <a:off x="838200" y="1825625"/>
+            <a:ext cx="10515600" cy="4351338"/>
+          </a:xfrm>
+          <a:prstGeom prst="rect">
+            <a:avLst/>
+          </a:prstGeom>
+          <a:noFill/>
+          <a:ln>
+            <a:noFill/>
+          </a:ln>
+        </p:spPr>
+        <p:txBody>
+          <a:bodyPr spcFirstLastPara="1" wrap="square" lIns="91425" tIns="45700" rIns="91425" bIns="45700" anchor="t" anchorCtr="0">
+            <a:normAutofit fontScale="92500" lnSpcReduction="20000"/>
+          </a:bodyPr>
+          <a:lstStyle/>
+          <a:p>
+            <a:pPr marL="228600" lvl="0" indent="-228600" algn="l" rtl="0">
+              <a:lnSpc>
+                <a:spcPct val="90000"/>
+              </a:lnSpc>
+              <a:spcBef>
+                <a:spcPts val="0"/>
+              </a:spcBef>
+              <a:spcAft>
+                <a:spcPts val="0"/>
+              </a:spcAft>
+              <a:buClr>
+                <a:schemeClr val="dk1"/>
+              </a:buClr>
+              <a:buSzPct val="100000"/>
+              <a:buChar char="•"/>
+            </a:pPr>
+            <a:r>
+              <a:rPr lang="en-US"/>
+              <a:t>EDTA - the Extensive de novo TE Annotator</a:t>
+            </a:r>
+            <a:endParaRPr/>
+          </a:p>
+          <a:p>
+            <a:pPr marL="228600" lvl="0" indent="-228600" algn="l" rtl="0">
+              <a:lnSpc>
+                <a:spcPct val="90000"/>
+              </a:lnSpc>
+              <a:spcBef>
+                <a:spcPts val="1000"/>
+              </a:spcBef>
+              <a:spcAft>
+                <a:spcPts val="0"/>
+              </a:spcAft>
+              <a:buClr>
+                <a:schemeClr val="dk1"/>
+              </a:buClr>
+              <a:buSzPct val="100000"/>
+              <a:buChar char="•"/>
+            </a:pPr>
+            <a:r>
+              <a:rPr lang="en-US"/>
+              <a:t>Protexcluder</a:t>
+            </a:r>
+            <a:endParaRPr/>
+          </a:p>
+          <a:p>
+            <a:pPr marL="228600" lvl="0" indent="-228600" algn="l" rtl="0">
+              <a:lnSpc>
+                <a:spcPct val="90000"/>
+              </a:lnSpc>
+              <a:spcBef>
+                <a:spcPts val="1000"/>
+              </a:spcBef>
+              <a:spcAft>
+                <a:spcPts val="0"/>
+              </a:spcAft>
+              <a:buClr>
+                <a:schemeClr val="dk1"/>
+              </a:buClr>
+              <a:buSzPct val="100000"/>
+              <a:buChar char="•"/>
+            </a:pPr>
+            <a:r>
+              <a:rPr lang="en-US"/>
+              <a:t>RepeatModeler</a:t>
+            </a:r>
+            <a:endParaRPr/>
+          </a:p>
+          <a:p>
+            <a:pPr marL="228600" lvl="0" indent="-228600" algn="l" rtl="0">
+              <a:lnSpc>
+                <a:spcPct val="90000"/>
+              </a:lnSpc>
+              <a:spcBef>
+                <a:spcPts val="1000"/>
+              </a:spcBef>
+              <a:spcAft>
+                <a:spcPts val="0"/>
+              </a:spcAft>
+              <a:buClr>
+                <a:schemeClr val="dk1"/>
+              </a:buClr>
+              <a:buSzPct val="100000"/>
+              <a:buChar char="•"/>
+            </a:pPr>
+            <a:r>
+              <a:rPr lang="en-US"/>
+              <a:t>Repeatmasker</a:t>
+            </a:r>
+            <a:endParaRPr/>
+          </a:p>
+          <a:p>
+            <a:pPr marL="228600" lvl="0" indent="-228600" algn="l" rtl="0">
+              <a:lnSpc>
+                <a:spcPct val="90000"/>
+              </a:lnSpc>
+              <a:spcBef>
+                <a:spcPts val="1000"/>
+              </a:spcBef>
+              <a:spcAft>
+                <a:spcPts val="0"/>
+              </a:spcAft>
+              <a:buClr>
+                <a:schemeClr val="dk1"/>
+              </a:buClr>
+              <a:buSzPct val="100000"/>
+              <a:buChar char="•"/>
+            </a:pPr>
+            <a:r>
+              <a:rPr lang="en-US"/>
+              <a:t>Braker</a:t>
+            </a:r>
+            <a:endParaRPr/>
+          </a:p>
+          <a:p>
+            <a:pPr marL="228600" lvl="0" indent="-228600" algn="l" rtl="0">
+              <a:lnSpc>
+                <a:spcPct val="90000"/>
+              </a:lnSpc>
+              <a:spcBef>
+                <a:spcPts val="1000"/>
+              </a:spcBef>
+              <a:spcAft>
+                <a:spcPts val="0"/>
+              </a:spcAft>
+              <a:buClr>
+                <a:schemeClr val="dk1"/>
+              </a:buClr>
+              <a:buSzPct val="100000"/>
+              <a:buChar char="•"/>
+            </a:pPr>
+            <a:r>
+              <a:rPr lang="en-US"/>
+              <a:t>Augustus</a:t>
+            </a:r>
+            <a:endParaRPr/>
+          </a:p>
+          <a:p>
+            <a:pPr marL="228600" lvl="0" indent="-228600" algn="l" rtl="0">
+              <a:lnSpc>
+                <a:spcPct val="90000"/>
+              </a:lnSpc>
+              <a:spcBef>
+                <a:spcPts val="1000"/>
+              </a:spcBef>
+              <a:spcAft>
+                <a:spcPts val="0"/>
+              </a:spcAft>
+              <a:buClr>
+                <a:schemeClr val="dk1"/>
+              </a:buClr>
+              <a:buSzPct val="100000"/>
+              <a:buChar char="•"/>
+            </a:pPr>
+            <a:r>
+              <a:rPr lang="en-US"/>
+              <a:t>Snap</a:t>
+            </a:r>
+            <a:endParaRPr/>
+          </a:p>
+          <a:p>
+            <a:pPr marL="228600" lvl="0" indent="-228600" algn="l" rtl="0">
+              <a:lnSpc>
+                <a:spcPct val="90000"/>
+              </a:lnSpc>
+              <a:spcBef>
+                <a:spcPts val="1000"/>
+              </a:spcBef>
+              <a:spcAft>
+                <a:spcPts val="0"/>
+              </a:spcAft>
+              <a:buClr>
+                <a:schemeClr val="dk1"/>
+              </a:buClr>
+              <a:buSzPct val="100000"/>
+              <a:buChar char="•"/>
+            </a:pPr>
+            <a:r>
+              <a:rPr lang="en-US" strike="sngStrike"/>
+              <a:t>Maker</a:t>
+            </a:r>
+            <a:endParaRPr/>
+          </a:p>
+          <a:p>
+            <a:pPr marL="228600" lvl="0" indent="-228600" algn="l" rtl="0">
+              <a:lnSpc>
+                <a:spcPct val="90000"/>
+              </a:lnSpc>
+              <a:spcBef>
+                <a:spcPts val="1000"/>
+              </a:spcBef>
+              <a:spcAft>
+                <a:spcPts val="0"/>
+              </a:spcAft>
+              <a:buClr>
+                <a:schemeClr val="dk1"/>
+              </a:buClr>
+              <a:buSzPct val="100000"/>
+              <a:buChar char="•"/>
+            </a:pPr>
+            <a:r>
+              <a:rPr lang="en-US"/>
+              <a:t>Apollo</a:t>
+            </a:r>
+            <a:endParaRPr/>
+          </a:p>
+          <a:p>
+            <a:pPr marL="228600" lvl="0" indent="-228600" algn="l" rtl="0">
+              <a:lnSpc>
+                <a:spcPct val="90000"/>
+              </a:lnSpc>
+              <a:spcBef>
+                <a:spcPts val="1000"/>
+              </a:spcBef>
+              <a:spcAft>
+                <a:spcPts val="0"/>
+              </a:spcAft>
+              <a:buClr>
+                <a:schemeClr val="dk1"/>
+              </a:buClr>
+              <a:buSzPct val="100000"/>
+              <a:buChar char="•"/>
+            </a:pPr>
+            <a:r>
+              <a:rPr lang="en-US"/>
+              <a:t>BUSCO</a:t>
+            </a:r>
+            <a:endParaRPr/>
+          </a:p>
+        </p:txBody>
+      </p:sp>
+    </p:spTree>
+  </p:cSld>
+  <p:clrMapOvr>
+    <a:masterClrMapping/>
+  </p:clrMapOvr>
+</p:sld>
+</file>
+
+<file path=ppt/slides/slide24.xml><?xml version="1.0" encoding="utf-8"?>
+<p:sld xmlns:a="http://schemas.openxmlformats.org/drawingml/2006/main" xmlns:r="http://schemas.openxmlformats.org/officeDocument/2006/relationships" xmlns:p="http://schemas.openxmlformats.org/presentationml/2006/main">
+  <p:cSld>
+    <p:spTree>
+      <p:nvGrpSpPr>
+        <p:cNvPr id="1" name="Shape 162"/>
+        <p:cNvGrpSpPr/>
+        <p:nvPr/>
+      </p:nvGrpSpPr>
+      <p:grpSpPr>
+        <a:xfrm>
+          <a:off x="0" y="0"/>
+          <a:ext cx="0" cy="0"/>
+          <a:chOff x="0" y="0"/>
+          <a:chExt cx="0" cy="0"/>
+        </a:xfrm>
+      </p:grpSpPr>
+      <p:sp>
+        <p:nvSpPr>
+          <p:cNvPr id="163" name="Google Shape;163;p14"/>
+          <p:cNvSpPr txBox="1">
+            <a:spLocks noGrp="1"/>
+          </p:cNvSpPr>
+          <p:nvPr>
+            <p:ph type="title"/>
+          </p:nvPr>
+        </p:nvSpPr>
+        <p:spPr>
+          <a:xfrm>
+            <a:off x="838200" y="365125"/>
+            <a:ext cx="10515600" cy="1325563"/>
+          </a:xfrm>
+          <a:prstGeom prst="rect">
+            <a:avLst/>
+          </a:prstGeom>
+          <a:noFill/>
+          <a:ln>
+            <a:noFill/>
+          </a:ln>
+        </p:spPr>
+        <p:txBody>
+          <a:bodyPr spcFirstLastPara="1" wrap="square" lIns="91425" tIns="45700" rIns="91425" bIns="45700" anchor="ctr" anchorCtr="0">
+            <a:normAutofit/>
+          </a:bodyPr>
+          <a:lstStyle/>
+          <a:p>
+            <a:pPr marL="0" lvl="0" indent="0" algn="l" rtl="0">
+              <a:lnSpc>
+                <a:spcPct val="90000"/>
+              </a:lnSpc>
+              <a:spcBef>
+                <a:spcPts val="0"/>
+              </a:spcBef>
+              <a:spcAft>
+                <a:spcPts val="0"/>
+              </a:spcAft>
+              <a:buClr>
+                <a:schemeClr val="dk1"/>
+              </a:buClr>
+              <a:buSzPts val="4400"/>
+              <a:buFont typeface="Play"/>
+              <a:buNone/>
+            </a:pPr>
+            <a:r>
+              <a:rPr lang="en-US"/>
+              <a:t>Tools for functional annotation</a:t>
+            </a:r>
+            <a:endParaRPr/>
+          </a:p>
+        </p:txBody>
+      </p:sp>
+      <p:sp>
+        <p:nvSpPr>
+          <p:cNvPr id="164" name="Google Shape;164;p14"/>
+          <p:cNvSpPr txBox="1">
+            <a:spLocks noGrp="1"/>
+          </p:cNvSpPr>
+          <p:nvPr>
+            <p:ph type="body" idx="1"/>
+          </p:nvPr>
+        </p:nvSpPr>
+        <p:spPr>
+          <a:xfrm>
+            <a:off x="838200" y="1825625"/>
+            <a:ext cx="10515600" cy="4351338"/>
+          </a:xfrm>
+          <a:prstGeom prst="rect">
+            <a:avLst/>
+          </a:prstGeom>
+          <a:noFill/>
+          <a:ln>
+            <a:noFill/>
+          </a:ln>
+        </p:spPr>
+        <p:txBody>
+          <a:bodyPr spcFirstLastPara="1" wrap="square" lIns="91425" tIns="45700" rIns="91425" bIns="45700" anchor="t" anchorCtr="0">
+            <a:normAutofit/>
+          </a:bodyPr>
+          <a:lstStyle/>
+          <a:p>
+            <a:pPr marL="228600" lvl="0" indent="-228600" algn="l" rtl="0">
+              <a:lnSpc>
+                <a:spcPct val="90000"/>
+              </a:lnSpc>
+              <a:spcBef>
+                <a:spcPts val="0"/>
+              </a:spcBef>
+              <a:spcAft>
+                <a:spcPts val="0"/>
+              </a:spcAft>
+              <a:buClr>
+                <a:schemeClr val="dk1"/>
+              </a:buClr>
+              <a:buSzPts val="2800"/>
+              <a:buChar char="•"/>
+            </a:pPr>
+            <a:r>
+              <a:rPr lang="en-US"/>
+              <a:t>BLAST</a:t>
+            </a:r>
+            <a:endParaRPr/>
+          </a:p>
+          <a:p>
+            <a:pPr marL="228600" lvl="0" indent="-228600" algn="l" rtl="0">
+              <a:lnSpc>
+                <a:spcPct val="90000"/>
+              </a:lnSpc>
+              <a:spcBef>
+                <a:spcPts val="1000"/>
+              </a:spcBef>
+              <a:spcAft>
+                <a:spcPts val="0"/>
+              </a:spcAft>
+              <a:buClr>
+                <a:schemeClr val="dk1"/>
+              </a:buClr>
+              <a:buSzPts val="2800"/>
+              <a:buChar char="•"/>
+            </a:pPr>
+            <a:r>
+              <a:rPr lang="en-US"/>
+              <a:t>Diamond</a:t>
+            </a:r>
+            <a:endParaRPr/>
+          </a:p>
+          <a:p>
+            <a:pPr marL="228600" lvl="0" indent="-228600" algn="l" rtl="0">
+              <a:lnSpc>
+                <a:spcPct val="90000"/>
+              </a:lnSpc>
+              <a:spcBef>
+                <a:spcPts val="1000"/>
+              </a:spcBef>
+              <a:spcAft>
+                <a:spcPts val="0"/>
+              </a:spcAft>
+              <a:buClr>
+                <a:schemeClr val="dk1"/>
+              </a:buClr>
+              <a:buSzPts val="2800"/>
+              <a:buChar char="•"/>
+            </a:pPr>
+            <a:r>
+              <a:rPr lang="en-US"/>
+              <a:t>InterProScan</a:t>
+            </a:r>
+            <a:endParaRPr/>
+          </a:p>
+          <a:p>
+            <a:pPr marL="228600" lvl="0" indent="-228600" algn="l" rtl="0">
+              <a:lnSpc>
+                <a:spcPct val="90000"/>
+              </a:lnSpc>
+              <a:spcBef>
+                <a:spcPts val="1000"/>
+              </a:spcBef>
+              <a:spcAft>
+                <a:spcPts val="0"/>
+              </a:spcAft>
+              <a:buClr>
+                <a:schemeClr val="dk1"/>
+              </a:buClr>
+              <a:buSzPts val="2800"/>
+              <a:buChar char="•"/>
+            </a:pPr>
+            <a:r>
+              <a:rPr lang="en-US"/>
+              <a:t>Mercator</a:t>
+            </a:r>
+            <a:endParaRPr/>
+          </a:p>
+          <a:p>
+            <a:pPr marL="228600" lvl="0" indent="-228600" algn="l" rtl="0">
+              <a:lnSpc>
+                <a:spcPct val="90000"/>
+              </a:lnSpc>
+              <a:spcBef>
+                <a:spcPts val="1000"/>
+              </a:spcBef>
+              <a:spcAft>
+                <a:spcPts val="0"/>
+              </a:spcAft>
+              <a:buClr>
+                <a:schemeClr val="dk1"/>
+              </a:buClr>
+              <a:buSzPts val="2800"/>
+              <a:buChar char="•"/>
+            </a:pPr>
+            <a:r>
+              <a:rPr lang="en-US"/>
+              <a:t>Databases: Swiss-prot, Trembl, nr, InterPro</a:t>
+            </a:r>
+            <a:endParaRPr/>
+          </a:p>
+        </p:txBody>
+      </p:sp>
+    </p:spTree>
+  </p:cSld>
+  <p:clrMapOvr>
+    <a:masterClrMapping/>
+  </p:clrMapOvr>
+</p:sld>
+</file>
+
+<file path=ppt/slides/slide25.xml><?xml version="1.0" encoding="utf-8"?>
+<p:sld xmlns:a="http://schemas.openxmlformats.org/drawingml/2006/main" xmlns:r="http://schemas.openxmlformats.org/officeDocument/2006/relationships" xmlns:p="http://schemas.openxmlformats.org/presentationml/2006/main">
+  <p:cSld>
+    <p:spTree>
+      <p:nvGrpSpPr>
         <p:cNvPr id="1" name="Shape 168"/>
         <p:cNvGrpSpPr/>
         <p:nvPr/>
@@ -16238,7 +17882,7 @@
 </p:sld>
 </file>
 
-<file path=ppt/slides/slide21.xml><?xml version="1.0" encoding="utf-8"?>
+<file path=ppt/slides/slide26.xml><?xml version="1.0" encoding="utf-8"?>
 <p:sld xmlns:a="http://schemas.openxmlformats.org/drawingml/2006/main" xmlns:r="http://schemas.openxmlformats.org/officeDocument/2006/relationships" xmlns:p="http://schemas.openxmlformats.org/presentationml/2006/main">
   <p:cSld>
     <p:spTree>

</xml_diff>